<commit_message>
interim: added step 2 blob images
</commit_message>
<xml_diff>
--- a/Presentations/InterimPresentation.pptx
+++ b/Presentations/InterimPresentation.pptx
@@ -3945,7 +3945,12 @@
             <p:ph idx="1"/>
           </p:nvPr>
         </p:nvSpPr>
-        <p:spPr/>
+        <p:spPr>
+          <a:xfrm>
+            <a:off x="253829" y="1212285"/>
+            <a:ext cx="8640960" cy="3400026"/>
+          </a:xfrm>
+        </p:spPr>
         <p:txBody>
           <a:bodyPr/>
           <a:lstStyle/>
@@ -4079,6 +4084,197 @@
           </a:prstGeom>
         </p:spPr>
       </p:pic>
+      <p:pic>
+        <p:nvPicPr>
+          <p:cNvPr id="7" name="Grafik 6">
+            <a:extLst>
+              <a:ext uri="{FF2B5EF4-FFF2-40B4-BE49-F238E27FC236}">
+                <a16:creationId xmlns:a16="http://schemas.microsoft.com/office/drawing/2014/main" id="{0DC0684F-8841-46B5-8607-0B63DFD709A0}"/>
+              </a:ext>
+            </a:extLst>
+          </p:cNvPr>
+          <p:cNvPicPr>
+            <a:picLocks noChangeAspect="1"/>
+          </p:cNvPicPr>
+          <p:nvPr/>
+        </p:nvPicPr>
+        <p:blipFill>
+          <a:blip r:embed="rId4">
+            <a:extLst>
+              <a:ext uri="{28A0092B-C50C-407E-A947-70E740481C1C}">
+                <a14:useLocalDpi xmlns:a14="http://schemas.microsoft.com/office/drawing/2010/main" val="0"/>
+              </a:ext>
+            </a:extLst>
+          </a:blip>
+          <a:stretch>
+            <a:fillRect/>
+          </a:stretch>
+        </p:blipFill>
+        <p:spPr>
+          <a:xfrm>
+            <a:off x="4788024" y="1202574"/>
+            <a:ext cx="1766234" cy="2995672"/>
+          </a:xfrm>
+          <a:prstGeom prst="rect">
+            <a:avLst/>
+          </a:prstGeom>
+        </p:spPr>
+      </p:pic>
+      <p:pic>
+        <p:nvPicPr>
+          <p:cNvPr id="9" name="Grafik 8">
+            <a:extLst>
+              <a:ext uri="{FF2B5EF4-FFF2-40B4-BE49-F238E27FC236}">
+                <a16:creationId xmlns:a16="http://schemas.microsoft.com/office/drawing/2014/main" id="{9A7AA004-C9F5-48D5-B774-F727359FB7CB}"/>
+              </a:ext>
+            </a:extLst>
+          </p:cNvPr>
+          <p:cNvPicPr>
+            <a:picLocks noChangeAspect="1"/>
+          </p:cNvPicPr>
+          <p:nvPr/>
+        </p:nvPicPr>
+        <p:blipFill>
+          <a:blip r:embed="rId5">
+            <a:extLst>
+              <a:ext uri="{28A0092B-C50C-407E-A947-70E740481C1C}">
+                <a14:useLocalDpi xmlns:a14="http://schemas.microsoft.com/office/drawing/2010/main" val="0"/>
+              </a:ext>
+            </a:extLst>
+          </a:blip>
+          <a:stretch>
+            <a:fillRect/>
+          </a:stretch>
+        </p:blipFill>
+        <p:spPr>
+          <a:xfrm>
+            <a:off x="6948264" y="1202574"/>
+            <a:ext cx="1766234" cy="2995672"/>
+          </a:xfrm>
+          <a:prstGeom prst="rect">
+            <a:avLst/>
+          </a:prstGeom>
+        </p:spPr>
+      </p:pic>
+      <p:cxnSp>
+        <p:nvCxnSpPr>
+          <p:cNvPr id="11" name="Gerade Verbindung mit Pfeil 10">
+            <a:extLst>
+              <a:ext uri="{FF2B5EF4-FFF2-40B4-BE49-F238E27FC236}">
+                <a16:creationId xmlns:a16="http://schemas.microsoft.com/office/drawing/2014/main" id="{1B1AB26F-1ACD-43FD-A047-AD9C3A1200A2}"/>
+              </a:ext>
+            </a:extLst>
+          </p:cNvPr>
+          <p:cNvCxnSpPr>
+            <a:cxnSpLocks/>
+          </p:cNvCxnSpPr>
+          <p:nvPr/>
+        </p:nvCxnSpPr>
+        <p:spPr>
+          <a:xfrm flipV="1">
+            <a:off x="6372200" y="1779662"/>
+            <a:ext cx="864096" cy="1728192"/>
+          </a:xfrm>
+          <a:prstGeom prst="straightConnector1">
+            <a:avLst/>
+          </a:prstGeom>
+          <a:ln>
+            <a:tailEnd type="triangle"/>
+          </a:ln>
+        </p:spPr>
+        <p:style>
+          <a:lnRef idx="3">
+            <a:schemeClr val="accent4"/>
+          </a:lnRef>
+          <a:fillRef idx="0">
+            <a:schemeClr val="accent4"/>
+          </a:fillRef>
+          <a:effectRef idx="2">
+            <a:schemeClr val="accent4"/>
+          </a:effectRef>
+          <a:fontRef idx="minor">
+            <a:schemeClr val="tx1"/>
+          </a:fontRef>
+        </p:style>
+      </p:cxnSp>
+      <p:sp>
+        <p:nvSpPr>
+          <p:cNvPr id="14" name="Textfeld 13">
+            <a:extLst>
+              <a:ext uri="{FF2B5EF4-FFF2-40B4-BE49-F238E27FC236}">
+                <a16:creationId xmlns:a16="http://schemas.microsoft.com/office/drawing/2014/main" id="{090A2859-C7A8-4002-9856-93E5CA5DA06A}"/>
+              </a:ext>
+            </a:extLst>
+          </p:cNvPr>
+          <p:cNvSpPr txBox="1"/>
+          <p:nvPr/>
+        </p:nvSpPr>
+        <p:spPr>
+          <a:xfrm>
+            <a:off x="6948264" y="4198246"/>
+            <a:ext cx="1766234" cy="246221"/>
+          </a:xfrm>
+          <a:prstGeom prst="rect">
+            <a:avLst/>
+          </a:prstGeom>
+          <a:noFill/>
+        </p:spPr>
+        <p:txBody>
+          <a:bodyPr wrap="square" rtlCol="0">
+            <a:spAutoFit/>
+          </a:bodyPr>
+          <a:lstStyle/>
+          <a:p>
+            <a:pPr algn="ctr"/>
+            <a:r>
+              <a:rPr lang="de-DE" sz="1000" dirty="0" err="1"/>
+              <a:t>Blob</a:t>
+            </a:r>
+            <a:r>
+              <a:rPr lang="de-DE" sz="1000" dirty="0"/>
+              <a:t> Image</a:t>
+            </a:r>
+            <a:endParaRPr lang="en-DE" sz="1000" dirty="0"/>
+          </a:p>
+        </p:txBody>
+      </p:sp>
+      <p:sp>
+        <p:nvSpPr>
+          <p:cNvPr id="15" name="Textfeld 14">
+            <a:extLst>
+              <a:ext uri="{FF2B5EF4-FFF2-40B4-BE49-F238E27FC236}">
+                <a16:creationId xmlns:a16="http://schemas.microsoft.com/office/drawing/2014/main" id="{DBBD06D9-1652-4DD6-8B57-C7708635D316}"/>
+              </a:ext>
+            </a:extLst>
+          </p:cNvPr>
+          <p:cNvSpPr txBox="1"/>
+          <p:nvPr/>
+        </p:nvSpPr>
+        <p:spPr>
+          <a:xfrm>
+            <a:off x="4788024" y="4198246"/>
+            <a:ext cx="1766234" cy="246221"/>
+          </a:xfrm>
+          <a:prstGeom prst="rect">
+            <a:avLst/>
+          </a:prstGeom>
+          <a:noFill/>
+        </p:spPr>
+        <p:txBody>
+          <a:bodyPr wrap="square" rtlCol="0">
+            <a:spAutoFit/>
+          </a:bodyPr>
+          <a:lstStyle/>
+          <a:p>
+            <a:pPr algn="ctr"/>
+            <a:r>
+              <a:rPr lang="de-DE" sz="1000" dirty="0"/>
+              <a:t>Raw Image</a:t>
+            </a:r>
+            <a:endParaRPr lang="en-DE" sz="1000" dirty="0"/>
+          </a:p>
+        </p:txBody>
+      </p:sp>
     </p:spTree>
     <p:extLst>
       <p:ext uri="{BB962C8B-B14F-4D97-AF65-F5344CB8AC3E}">

</xml_diff>

<commit_message>
Added Step 2 images and CNN model
</commit_message>
<xml_diff>
--- a/Presentations/InterimPresentation.pptx
+++ b/Presentations/InterimPresentation.pptx
@@ -5,20 +5,22 @@
     <p:sldMasterId id="2147483648" r:id="rId1"/>
   </p:sldMasterIdLst>
   <p:notesMasterIdLst>
-    <p:notesMasterId r:id="rId13"/>
+    <p:notesMasterId r:id="rId15"/>
   </p:notesMasterIdLst>
   <p:sldIdLst>
     <p:sldId id="259" r:id="rId2"/>
     <p:sldId id="265" r:id="rId3"/>
     <p:sldId id="271" r:id="rId4"/>
     <p:sldId id="272" r:id="rId5"/>
-    <p:sldId id="268" r:id="rId6"/>
-    <p:sldId id="266" r:id="rId7"/>
-    <p:sldId id="267" r:id="rId8"/>
-    <p:sldId id="273" r:id="rId9"/>
-    <p:sldId id="274" r:id="rId10"/>
-    <p:sldId id="270" r:id="rId11"/>
-    <p:sldId id="263" r:id="rId12"/>
+    <p:sldId id="275" r:id="rId6"/>
+    <p:sldId id="276" r:id="rId7"/>
+    <p:sldId id="268" r:id="rId8"/>
+    <p:sldId id="266" r:id="rId9"/>
+    <p:sldId id="267" r:id="rId10"/>
+    <p:sldId id="273" r:id="rId11"/>
+    <p:sldId id="274" r:id="rId12"/>
+    <p:sldId id="270" r:id="rId13"/>
+    <p:sldId id="263" r:id="rId14"/>
   </p:sldIdLst>
   <p:sldSz cx="9144000" cy="5143500" type="screen16x9"/>
   <p:notesSz cx="6858000" cy="9144000"/>
@@ -232,7 +234,7 @@
           <a:p>
             <a:fld id="{3D100699-F170-47EF-8601-8ACFF448602A}" type="datetimeFigureOut">
               <a:rPr lang="de-DE" smtClean="0"/>
-              <a:t>07.01.2019</a:t>
+              <a:t>08.01.2019</a:t>
             </a:fld>
             <a:endParaRPr lang="de-DE"/>
           </a:p>
@@ -627,6 +629,42 @@
           <a:bodyPr/>
           <a:lstStyle/>
           <a:p>
+            <a:r>
+              <a:rPr lang="de-DE" dirty="0" err="1"/>
+              <a:t>Flatten</a:t>
+            </a:r>
+            <a:r>
+              <a:rPr lang="de-DE" dirty="0"/>
+              <a:t> </a:t>
+            </a:r>
+            <a:r>
+              <a:rPr lang="de-DE" dirty="0" err="1"/>
+              <a:t>between</a:t>
+            </a:r>
+            <a:r>
+              <a:rPr lang="de-DE" dirty="0"/>
+              <a:t> </a:t>
+            </a:r>
+            <a:r>
+              <a:rPr lang="de-DE" dirty="0" err="1"/>
+              <a:t>second</a:t>
+            </a:r>
+            <a:r>
+              <a:rPr lang="de-DE" dirty="0"/>
+              <a:t> </a:t>
+            </a:r>
+            <a:r>
+              <a:rPr lang="de-DE" dirty="0" err="1"/>
+              <a:t>batch</a:t>
+            </a:r>
+            <a:r>
+              <a:rPr lang="de-DE" dirty="0"/>
+              <a:t> and </a:t>
+            </a:r>
+            <a:r>
+              <a:rPr lang="de-DE" dirty="0" err="1"/>
+              <a:t>dense</a:t>
+            </a:r>
             <a:endParaRPr lang="en-DE" dirty="0"/>
           </a:p>
         </p:txBody>
@@ -732,7 +770,7 @@
           <a:p>
             <a:fld id="{6F4F2A7C-E896-4C15-99D8-2B5BC94A4F36}" type="slidenum">
               <a:rPr lang="de-DE" smtClean="0"/>
-              <a:t>10</a:t>
+              <a:t>12</a:t>
             </a:fld>
             <a:endParaRPr lang="de-DE"/>
           </a:p>
@@ -2921,58 +2959,47 @@
           <a:chExt cx="0" cy="0"/>
         </a:xfrm>
       </p:grpSpPr>
-      <p:sp>
-        <p:nvSpPr>
-          <p:cNvPr id="2" name="Inhaltsplatzhalter 1">
+      <p:pic>
+        <p:nvPicPr>
+          <p:cNvPr id="6" name="Inhaltsplatzhalter 5">
             <a:extLst>
               <a:ext uri="{FF2B5EF4-FFF2-40B4-BE49-F238E27FC236}">
-                <a16:creationId xmlns:a16="http://schemas.microsoft.com/office/drawing/2014/main" id="{7E63AEB2-2FE4-4010-8A85-386F6D3D7A7B}"/>
+                <a16:creationId xmlns:a16="http://schemas.microsoft.com/office/drawing/2014/main" id="{201A2C48-CE71-45D1-B651-097D8A492D9D}"/>
               </a:ext>
             </a:extLst>
           </p:cNvPr>
-          <p:cNvSpPr>
-            <a:spLocks noGrp="1"/>
-          </p:cNvSpPr>
+          <p:cNvPicPr>
+            <a:picLocks noGrp="1" noChangeAspect="1"/>
+          </p:cNvPicPr>
           <p:nvPr>
             <p:ph idx="1"/>
           </p:nvPr>
-        </p:nvSpPr>
-        <p:spPr/>
-        <p:txBody>
-          <a:bodyPr/>
-          <a:lstStyle/>
-          <a:p>
-            <a:r>
-              <a:rPr lang="en-GB" dirty="0"/>
-              <a:t>LSTM to the rescue</a:t>
-            </a:r>
-          </a:p>
-          <a:p>
-            <a:r>
-              <a:rPr lang="en-GB" dirty="0"/>
-              <a:t>Hopefully better test results</a:t>
-            </a:r>
-          </a:p>
-          <a:p>
-            <a:r>
-              <a:rPr lang="en-GB" dirty="0"/>
-              <a:t>Hopefully less overfitting</a:t>
-            </a:r>
-          </a:p>
-          <a:p>
-            <a:r>
-              <a:rPr lang="en-GB" dirty="0"/>
-              <a:t>Currently work in progress</a:t>
-            </a:r>
-          </a:p>
-        </p:txBody>
-      </p:sp>
+        </p:nvPicPr>
+        <p:blipFill>
+          <a:blip r:embed="rId2">
+            <a:extLst>
+              <a:ext uri="{28A0092B-C50C-407E-A947-70E740481C1C}">
+                <a14:useLocalDpi xmlns:a14="http://schemas.microsoft.com/office/drawing/2010/main" val="0"/>
+              </a:ext>
+            </a:extLst>
+          </a:blip>
+          <a:stretch>
+            <a:fillRect/>
+          </a:stretch>
+        </p:blipFill>
+        <p:spPr>
+          <a:xfrm>
+            <a:off x="1503697" y="1203325"/>
+            <a:ext cx="6136605" cy="3398838"/>
+          </a:xfrm>
+        </p:spPr>
+      </p:pic>
       <p:sp>
         <p:nvSpPr>
           <p:cNvPr id="3" name="Foliennummernplatzhalter 2">
             <a:extLst>
               <a:ext uri="{FF2B5EF4-FFF2-40B4-BE49-F238E27FC236}">
-                <a16:creationId xmlns:a16="http://schemas.microsoft.com/office/drawing/2014/main" id="{690352B3-46CA-4F94-A201-BAEDA585035B}"/>
+                <a16:creationId xmlns:a16="http://schemas.microsoft.com/office/drawing/2014/main" id="{C9816B91-26FF-408A-B023-1C677B5F3B9B}"/>
               </a:ext>
             </a:extLst>
           </p:cNvPr>
@@ -3001,7 +3028,7 @@
           <p:cNvPr id="4" name="Titel 3">
             <a:extLst>
               <a:ext uri="{FF2B5EF4-FFF2-40B4-BE49-F238E27FC236}">
-                <a16:creationId xmlns:a16="http://schemas.microsoft.com/office/drawing/2014/main" id="{34529DC4-A0E7-4F9B-AA17-8A115DF3FEC5}"/>
+                <a16:creationId xmlns:a16="http://schemas.microsoft.com/office/drawing/2014/main" id="{5F546285-1A94-4CC7-A95D-E284F5184377}"/>
               </a:ext>
             </a:extLst>
           </p:cNvPr>
@@ -3019,7 +3046,7 @@
           <a:p>
             <a:r>
               <a:rPr lang="en-GB" dirty="0"/>
-              <a:t>Step 4 - Gesture Recognition - Solution</a:t>
+              <a:t>Step 3 - Gesture Recognition - CNN</a:t>
             </a:r>
             <a:endParaRPr lang="en-DE" dirty="0"/>
           </a:p>
@@ -3028,7 +3055,7 @@
     </p:spTree>
     <p:extLst>
       <p:ext uri="{BB962C8B-B14F-4D97-AF65-F5344CB8AC3E}">
-        <p14:creationId xmlns:p14="http://schemas.microsoft.com/office/powerpoint/2010/main" val="3162926880"/>
+        <p14:creationId xmlns:p14="http://schemas.microsoft.com/office/powerpoint/2010/main" val="162208365"/>
       </p:ext>
     </p:extLst>
   </p:cSld>
@@ -3055,6 +3082,263 @@
           <a:chExt cx="0" cy="0"/>
         </a:xfrm>
       </p:grpSpPr>
+      <p:pic>
+        <p:nvPicPr>
+          <p:cNvPr id="6" name="Inhaltsplatzhalter 5">
+            <a:extLst>
+              <a:ext uri="{FF2B5EF4-FFF2-40B4-BE49-F238E27FC236}">
+                <a16:creationId xmlns:a16="http://schemas.microsoft.com/office/drawing/2014/main" id="{201A2C48-CE71-45D1-B651-097D8A492D9D}"/>
+              </a:ext>
+            </a:extLst>
+          </p:cNvPr>
+          <p:cNvPicPr>
+            <a:picLocks noGrp="1" noChangeAspect="1"/>
+          </p:cNvPicPr>
+          <p:nvPr>
+            <p:ph idx="1"/>
+          </p:nvPr>
+        </p:nvPicPr>
+        <p:blipFill>
+          <a:blip r:embed="rId2">
+            <a:extLst>
+              <a:ext uri="{28A0092B-C50C-407E-A947-70E740481C1C}">
+                <a14:useLocalDpi xmlns:a14="http://schemas.microsoft.com/office/drawing/2010/main" val="0"/>
+              </a:ext>
+            </a:extLst>
+          </a:blip>
+          <a:stretch>
+            <a:fillRect/>
+          </a:stretch>
+        </p:blipFill>
+        <p:spPr>
+          <a:xfrm>
+            <a:off x="1503697" y="1203325"/>
+            <a:ext cx="6136605" cy="3398837"/>
+          </a:xfrm>
+        </p:spPr>
+      </p:pic>
+      <p:sp>
+        <p:nvSpPr>
+          <p:cNvPr id="3" name="Foliennummernplatzhalter 2">
+            <a:extLst>
+              <a:ext uri="{FF2B5EF4-FFF2-40B4-BE49-F238E27FC236}">
+                <a16:creationId xmlns:a16="http://schemas.microsoft.com/office/drawing/2014/main" id="{C9816B91-26FF-408A-B023-1C677B5F3B9B}"/>
+              </a:ext>
+            </a:extLst>
+          </p:cNvPr>
+          <p:cNvSpPr>
+            <a:spLocks noGrp="1"/>
+          </p:cNvSpPr>
+          <p:nvPr>
+            <p:ph type="sldNum" sz="quarter" idx="12"/>
+          </p:nvPr>
+        </p:nvSpPr>
+        <p:spPr/>
+        <p:txBody>
+          <a:bodyPr/>
+          <a:lstStyle/>
+          <a:p>
+            <a:fld id="{29AD3987-26BA-49DC-BA24-72731371DC9F}" type="slidenum">
+              <a:rPr lang="de-DE" smtClean="0"/>
+              <a:t>11</a:t>
+            </a:fld>
+            <a:endParaRPr lang="de-DE" dirty="0"/>
+          </a:p>
+        </p:txBody>
+      </p:sp>
+      <p:sp>
+        <p:nvSpPr>
+          <p:cNvPr id="4" name="Titel 3">
+            <a:extLst>
+              <a:ext uri="{FF2B5EF4-FFF2-40B4-BE49-F238E27FC236}">
+                <a16:creationId xmlns:a16="http://schemas.microsoft.com/office/drawing/2014/main" id="{5F546285-1A94-4CC7-A95D-E284F5184377}"/>
+              </a:ext>
+            </a:extLst>
+          </p:cNvPr>
+          <p:cNvSpPr>
+            <a:spLocks noGrp="1"/>
+          </p:cNvSpPr>
+          <p:nvPr>
+            <p:ph type="title"/>
+          </p:nvPr>
+        </p:nvSpPr>
+        <p:spPr/>
+        <p:txBody>
+          <a:bodyPr/>
+          <a:lstStyle/>
+          <a:p>
+            <a:r>
+              <a:rPr lang="en-GB" dirty="0"/>
+              <a:t>Step 3 - Gesture Recognition - CNN</a:t>
+            </a:r>
+            <a:endParaRPr lang="en-DE" dirty="0"/>
+          </a:p>
+        </p:txBody>
+      </p:sp>
+    </p:spTree>
+    <p:extLst>
+      <p:ext uri="{BB962C8B-B14F-4D97-AF65-F5344CB8AC3E}">
+        <p14:creationId xmlns:p14="http://schemas.microsoft.com/office/powerpoint/2010/main" val="2954922334"/>
+      </p:ext>
+    </p:extLst>
+  </p:cSld>
+  <p:clrMapOvr>
+    <a:masterClrMapping/>
+  </p:clrMapOvr>
+</p:sld>
+</file>
+
+<file path=ppt/slides/slide12.xml><?xml version="1.0" encoding="utf-8"?>
+<p:sld xmlns:a="http://schemas.openxmlformats.org/drawingml/2006/main" xmlns:r="http://schemas.openxmlformats.org/officeDocument/2006/relationships" xmlns:p="http://schemas.openxmlformats.org/presentationml/2006/main">
+  <p:cSld>
+    <p:spTree>
+      <p:nvGrpSpPr>
+        <p:cNvPr id="1" name=""/>
+        <p:cNvGrpSpPr/>
+        <p:nvPr/>
+      </p:nvGrpSpPr>
+      <p:grpSpPr>
+        <a:xfrm>
+          <a:off x="0" y="0"/>
+          <a:ext cx="0" cy="0"/>
+          <a:chOff x="0" y="0"/>
+          <a:chExt cx="0" cy="0"/>
+        </a:xfrm>
+      </p:grpSpPr>
+      <p:sp>
+        <p:nvSpPr>
+          <p:cNvPr id="2" name="Inhaltsplatzhalter 1">
+            <a:extLst>
+              <a:ext uri="{FF2B5EF4-FFF2-40B4-BE49-F238E27FC236}">
+                <a16:creationId xmlns:a16="http://schemas.microsoft.com/office/drawing/2014/main" id="{7E63AEB2-2FE4-4010-8A85-386F6D3D7A7B}"/>
+              </a:ext>
+            </a:extLst>
+          </p:cNvPr>
+          <p:cNvSpPr>
+            <a:spLocks noGrp="1"/>
+          </p:cNvSpPr>
+          <p:nvPr>
+            <p:ph idx="1"/>
+          </p:nvPr>
+        </p:nvSpPr>
+        <p:spPr/>
+        <p:txBody>
+          <a:bodyPr/>
+          <a:lstStyle/>
+          <a:p>
+            <a:r>
+              <a:rPr lang="en-GB" dirty="0"/>
+              <a:t>LSTM to the rescue</a:t>
+            </a:r>
+          </a:p>
+          <a:p>
+            <a:r>
+              <a:rPr lang="en-GB" dirty="0"/>
+              <a:t>Hopefully better test results</a:t>
+            </a:r>
+          </a:p>
+          <a:p>
+            <a:r>
+              <a:rPr lang="en-GB" dirty="0"/>
+              <a:t>Hopefully less overfitting</a:t>
+            </a:r>
+          </a:p>
+          <a:p>
+            <a:r>
+              <a:rPr lang="en-GB" dirty="0"/>
+              <a:t>Currently work in progress</a:t>
+            </a:r>
+          </a:p>
+        </p:txBody>
+      </p:sp>
+      <p:sp>
+        <p:nvSpPr>
+          <p:cNvPr id="3" name="Foliennummernplatzhalter 2">
+            <a:extLst>
+              <a:ext uri="{FF2B5EF4-FFF2-40B4-BE49-F238E27FC236}">
+                <a16:creationId xmlns:a16="http://schemas.microsoft.com/office/drawing/2014/main" id="{690352B3-46CA-4F94-A201-BAEDA585035B}"/>
+              </a:ext>
+            </a:extLst>
+          </p:cNvPr>
+          <p:cNvSpPr>
+            <a:spLocks noGrp="1"/>
+          </p:cNvSpPr>
+          <p:nvPr>
+            <p:ph type="sldNum" sz="quarter" idx="12"/>
+          </p:nvPr>
+        </p:nvSpPr>
+        <p:spPr/>
+        <p:txBody>
+          <a:bodyPr/>
+          <a:lstStyle/>
+          <a:p>
+            <a:fld id="{29AD3987-26BA-49DC-BA24-72731371DC9F}" type="slidenum">
+              <a:rPr lang="de-DE" smtClean="0"/>
+              <a:t>12</a:t>
+            </a:fld>
+            <a:endParaRPr lang="de-DE" dirty="0"/>
+          </a:p>
+        </p:txBody>
+      </p:sp>
+      <p:sp>
+        <p:nvSpPr>
+          <p:cNvPr id="4" name="Titel 3">
+            <a:extLst>
+              <a:ext uri="{FF2B5EF4-FFF2-40B4-BE49-F238E27FC236}">
+                <a16:creationId xmlns:a16="http://schemas.microsoft.com/office/drawing/2014/main" id="{34529DC4-A0E7-4F9B-AA17-8A115DF3FEC5}"/>
+              </a:ext>
+            </a:extLst>
+          </p:cNvPr>
+          <p:cNvSpPr>
+            <a:spLocks noGrp="1"/>
+          </p:cNvSpPr>
+          <p:nvPr>
+            <p:ph type="title"/>
+          </p:nvPr>
+        </p:nvSpPr>
+        <p:spPr/>
+        <p:txBody>
+          <a:bodyPr/>
+          <a:lstStyle/>
+          <a:p>
+            <a:r>
+              <a:rPr lang="en-GB" dirty="0"/>
+              <a:t>Step 4 - Gesture Recognition - Solution</a:t>
+            </a:r>
+            <a:endParaRPr lang="en-DE" dirty="0"/>
+          </a:p>
+        </p:txBody>
+      </p:sp>
+    </p:spTree>
+    <p:extLst>
+      <p:ext uri="{BB962C8B-B14F-4D97-AF65-F5344CB8AC3E}">
+        <p14:creationId xmlns:p14="http://schemas.microsoft.com/office/powerpoint/2010/main" val="3162926880"/>
+      </p:ext>
+    </p:extLst>
+  </p:cSld>
+  <p:clrMapOvr>
+    <a:masterClrMapping/>
+  </p:clrMapOvr>
+</p:sld>
+</file>
+
+<file path=ppt/slides/slide13.xml><?xml version="1.0" encoding="utf-8"?>
+<p:sld xmlns:a="http://schemas.openxmlformats.org/drawingml/2006/main" xmlns:r="http://schemas.openxmlformats.org/officeDocument/2006/relationships" xmlns:p="http://schemas.openxmlformats.org/presentationml/2006/main">
+  <p:cSld>
+    <p:spTree>
+      <p:nvGrpSpPr>
+        <p:cNvPr id="1" name=""/>
+        <p:cNvGrpSpPr/>
+        <p:nvPr/>
+      </p:nvGrpSpPr>
+      <p:grpSpPr>
+        <a:xfrm>
+          <a:off x="0" y="0"/>
+          <a:ext cx="0" cy="0"/>
+          <a:chOff x="0" y="0"/>
+          <a:chExt cx="0" cy="0"/>
+        </a:xfrm>
+      </p:grpSpPr>
       <p:sp>
         <p:nvSpPr>
           <p:cNvPr id="2" name="Inhaltsplatzhalter 1">
@@ -3125,7 +3409,7 @@
           <a:p>
             <a:fld id="{29AD3987-26BA-49DC-BA24-72731371DC9F}" type="slidenum">
               <a:rPr lang="de-DE" smtClean="0"/>
-              <a:t>11</a:t>
+              <a:t>13</a:t>
             </a:fld>
             <a:endParaRPr lang="de-DE" dirty="0"/>
           </a:p>
@@ -4417,15 +4701,1157 @@
             <p:ph idx="1"/>
           </p:nvPr>
         </p:nvSpPr>
-        <p:spPr/>
-        <p:txBody>
-          <a:bodyPr/>
+        <p:spPr>
+          <a:xfrm>
+            <a:off x="251520" y="1202574"/>
+            <a:ext cx="8640960" cy="3400026"/>
+          </a:xfrm>
+        </p:spPr>
+        <p:txBody>
+          <a:bodyPr>
+            <a:normAutofit/>
+          </a:bodyPr>
           <a:lstStyle/>
           <a:p>
-            <a:endParaRPr lang="en-DE"/>
-          </a:p>
-        </p:txBody>
-      </p:sp>
+            <a:r>
+              <a:rPr lang="de-DE" dirty="0"/>
+              <a:t>CNN </a:t>
+            </a:r>
+            <a:r>
+              <a:rPr lang="de-DE" dirty="0" err="1"/>
+              <a:t>to</a:t>
+            </a:r>
+            <a:r>
+              <a:rPr lang="de-DE" dirty="0"/>
+              <a:t> </a:t>
+            </a:r>
+            <a:r>
+              <a:rPr lang="de-DE" dirty="0" err="1"/>
+              <a:t>decide</a:t>
+            </a:r>
+            <a:r>
+              <a:rPr lang="de-DE" dirty="0"/>
+              <a:t> </a:t>
+            </a:r>
+            <a:r>
+              <a:rPr lang="de-DE" dirty="0" err="1"/>
+              <a:t>between</a:t>
+            </a:r>
+            <a:r>
+              <a:rPr lang="de-DE" dirty="0"/>
+              <a:t> Finger and </a:t>
+            </a:r>
+            <a:r>
+              <a:rPr lang="de-DE" dirty="0" err="1"/>
+              <a:t>Knuckle</a:t>
+            </a:r>
+            <a:endParaRPr lang="de-DE" dirty="0"/>
+          </a:p>
+          <a:p>
+            <a:r>
+              <a:rPr lang="de-DE" dirty="0"/>
+              <a:t>2 Layer:</a:t>
+            </a:r>
+          </a:p>
+          <a:p>
+            <a:pPr lvl="1"/>
+            <a:r>
+              <a:rPr lang="de-DE" dirty="0"/>
+              <a:t>2 x </a:t>
+            </a:r>
+            <a:r>
+              <a:rPr lang="de-DE" dirty="0" err="1"/>
+              <a:t>Convolution</a:t>
+            </a:r>
+            <a:endParaRPr lang="de-DE" dirty="0"/>
+          </a:p>
+          <a:p>
+            <a:pPr lvl="1"/>
+            <a:r>
+              <a:rPr lang="de-DE" dirty="0" err="1"/>
+              <a:t>MaxPooling</a:t>
+            </a:r>
+            <a:endParaRPr lang="de-DE" dirty="0"/>
+          </a:p>
+          <a:p>
+            <a:pPr lvl="1"/>
+            <a:r>
+              <a:rPr lang="de-DE" dirty="0"/>
+              <a:t>Dropout</a:t>
+            </a:r>
+          </a:p>
+          <a:p>
+            <a:r>
+              <a:rPr lang="de-DE" dirty="0"/>
+              <a:t>2 x </a:t>
+            </a:r>
+            <a:r>
+              <a:rPr lang="de-DE" dirty="0" err="1"/>
+              <a:t>Dense</a:t>
+            </a:r>
+            <a:endParaRPr lang="de-DE" dirty="0"/>
+          </a:p>
+        </p:txBody>
+      </p:sp>
+      <p:sp>
+        <p:nvSpPr>
+          <p:cNvPr id="9" name="Cube 8">
+            <a:extLst>
+              <a:ext uri="{FF2B5EF4-FFF2-40B4-BE49-F238E27FC236}">
+                <a16:creationId xmlns:a16="http://schemas.microsoft.com/office/drawing/2014/main" id="{7BFF481E-00ED-42D9-9688-EB7D82CE1F3E}"/>
+              </a:ext>
+            </a:extLst>
+          </p:cNvPr>
+          <p:cNvSpPr/>
+          <p:nvPr/>
+        </p:nvSpPr>
+        <p:spPr>
+          <a:xfrm>
+            <a:off x="5580112" y="3616890"/>
+            <a:ext cx="648072" cy="648072"/>
+          </a:xfrm>
+          <a:prstGeom prst="cube">
+            <a:avLst>
+              <a:gd name="adj" fmla="val 5474"/>
+            </a:avLst>
+          </a:prstGeom>
+          <a:ln w="15875"/>
+        </p:spPr>
+        <p:style>
+          <a:lnRef idx="2">
+            <a:schemeClr val="accent1">
+              <a:shade val="50000"/>
+            </a:schemeClr>
+          </a:lnRef>
+          <a:fillRef idx="1">
+            <a:schemeClr val="accent1"/>
+          </a:fillRef>
+          <a:effectRef idx="0">
+            <a:schemeClr val="accent1"/>
+          </a:effectRef>
+          <a:fontRef idx="minor">
+            <a:schemeClr val="lt1"/>
+          </a:fontRef>
+        </p:style>
+        <p:txBody>
+          <a:bodyPr rtlCol="0" anchor="ctr"/>
+          <a:lstStyle/>
+          <a:p>
+            <a:pPr algn="ctr"/>
+            <a:r>
+              <a:rPr lang="de-DE" sz="1200" dirty="0" err="1">
+                <a:solidFill>
+                  <a:schemeClr val="tx1"/>
+                </a:solidFill>
+              </a:rPr>
+              <a:t>Dense</a:t>
+            </a:r>
+            <a:endParaRPr lang="de-DE" sz="1200" dirty="0">
+              <a:solidFill>
+                <a:schemeClr val="tx1"/>
+              </a:solidFill>
+            </a:endParaRPr>
+          </a:p>
+        </p:txBody>
+      </p:sp>
+      <p:sp>
+        <p:nvSpPr>
+          <p:cNvPr id="10" name="Cube 9">
+            <a:extLst>
+              <a:ext uri="{FF2B5EF4-FFF2-40B4-BE49-F238E27FC236}">
+                <a16:creationId xmlns:a16="http://schemas.microsoft.com/office/drawing/2014/main" id="{038DD926-2B21-4BEC-9F3B-509123AFF6D0}"/>
+              </a:ext>
+            </a:extLst>
+          </p:cNvPr>
+          <p:cNvSpPr/>
+          <p:nvPr/>
+        </p:nvSpPr>
+        <p:spPr>
+          <a:xfrm>
+            <a:off x="6539783" y="3616890"/>
+            <a:ext cx="648072" cy="648073"/>
+          </a:xfrm>
+          <a:prstGeom prst="cube">
+            <a:avLst>
+              <a:gd name="adj" fmla="val 5474"/>
+            </a:avLst>
+          </a:prstGeom>
+          <a:ln w="15875"/>
+        </p:spPr>
+        <p:style>
+          <a:lnRef idx="2">
+            <a:schemeClr val="accent1">
+              <a:shade val="50000"/>
+            </a:schemeClr>
+          </a:lnRef>
+          <a:fillRef idx="1">
+            <a:schemeClr val="accent1"/>
+          </a:fillRef>
+          <a:effectRef idx="0">
+            <a:schemeClr val="accent1"/>
+          </a:effectRef>
+          <a:fontRef idx="minor">
+            <a:schemeClr val="lt1"/>
+          </a:fontRef>
+        </p:style>
+        <p:txBody>
+          <a:bodyPr rtlCol="0" anchor="ctr"/>
+          <a:lstStyle/>
+          <a:p>
+            <a:pPr algn="ctr"/>
+            <a:r>
+              <a:rPr lang="de-DE" sz="1200" dirty="0" err="1">
+                <a:solidFill>
+                  <a:schemeClr val="tx1"/>
+                </a:solidFill>
+              </a:rPr>
+              <a:t>Dense</a:t>
+            </a:r>
+            <a:endParaRPr lang="de-DE" sz="1200" dirty="0">
+              <a:solidFill>
+                <a:schemeClr val="tx1"/>
+              </a:solidFill>
+            </a:endParaRPr>
+          </a:p>
+        </p:txBody>
+      </p:sp>
+      <p:grpSp>
+        <p:nvGrpSpPr>
+          <p:cNvPr id="27" name="Gruppieren 26">
+            <a:extLst>
+              <a:ext uri="{FF2B5EF4-FFF2-40B4-BE49-F238E27FC236}">
+                <a16:creationId xmlns:a16="http://schemas.microsoft.com/office/drawing/2014/main" id="{9A4AA96B-369A-405A-8E3B-BF98BD9199BC}"/>
+              </a:ext>
+            </a:extLst>
+          </p:cNvPr>
+          <p:cNvGrpSpPr/>
+          <p:nvPr/>
+        </p:nvGrpSpPr>
+        <p:grpSpPr>
+          <a:xfrm>
+            <a:off x="2571842" y="3320716"/>
+            <a:ext cx="1225135" cy="1287998"/>
+            <a:chOff x="2621785" y="2852841"/>
+            <a:chExt cx="1225135" cy="1287998"/>
+          </a:xfrm>
+        </p:grpSpPr>
+        <p:sp>
+          <p:nvSpPr>
+            <p:cNvPr id="23" name="Cube 22">
+              <a:extLst>
+                <a:ext uri="{FF2B5EF4-FFF2-40B4-BE49-F238E27FC236}">
+                  <a16:creationId xmlns:a16="http://schemas.microsoft.com/office/drawing/2014/main" id="{F1A37E65-7038-4FCA-A328-B5409B0F683F}"/>
+                </a:ext>
+              </a:extLst>
+            </p:cNvPr>
+            <p:cNvSpPr/>
+            <p:nvPr/>
+          </p:nvSpPr>
+          <p:spPr>
+            <a:xfrm>
+              <a:off x="2838808" y="2852841"/>
+              <a:ext cx="1008112" cy="1008112"/>
+            </a:xfrm>
+            <a:prstGeom prst="cube">
+              <a:avLst>
+                <a:gd name="adj" fmla="val 3695"/>
+              </a:avLst>
+            </a:prstGeom>
+            <a:ln w="15875"/>
+          </p:spPr>
+          <p:style>
+            <a:lnRef idx="2">
+              <a:schemeClr val="accent1">
+                <a:shade val="50000"/>
+              </a:schemeClr>
+            </a:lnRef>
+            <a:fillRef idx="1">
+              <a:schemeClr val="accent1"/>
+            </a:fillRef>
+            <a:effectRef idx="0">
+              <a:schemeClr val="accent1"/>
+            </a:effectRef>
+            <a:fontRef idx="minor">
+              <a:schemeClr val="lt1"/>
+            </a:fontRef>
+          </p:style>
+          <p:txBody>
+            <a:bodyPr rtlCol="0" anchor="ctr"/>
+            <a:lstStyle/>
+            <a:p>
+              <a:pPr algn="ctr"/>
+              <a:endParaRPr lang="de-DE" sz="1200" dirty="0">
+                <a:solidFill>
+                  <a:schemeClr val="tx1"/>
+                </a:solidFill>
+              </a:endParaRPr>
+            </a:p>
+          </p:txBody>
+        </p:sp>
+        <p:sp>
+          <p:nvSpPr>
+            <p:cNvPr id="24" name="Cube 23">
+              <a:extLst>
+                <a:ext uri="{FF2B5EF4-FFF2-40B4-BE49-F238E27FC236}">
+                  <a16:creationId xmlns:a16="http://schemas.microsoft.com/office/drawing/2014/main" id="{264B0F3B-BBBE-4622-9907-AC85985684EC}"/>
+                </a:ext>
+              </a:extLst>
+            </p:cNvPr>
+            <p:cNvSpPr/>
+            <p:nvPr/>
+          </p:nvSpPr>
+          <p:spPr>
+            <a:xfrm>
+              <a:off x="2766800" y="2937105"/>
+              <a:ext cx="1008112" cy="1008112"/>
+            </a:xfrm>
+            <a:prstGeom prst="cube">
+              <a:avLst>
+                <a:gd name="adj" fmla="val 3695"/>
+              </a:avLst>
+            </a:prstGeom>
+            <a:ln w="15875"/>
+          </p:spPr>
+          <p:style>
+            <a:lnRef idx="2">
+              <a:schemeClr val="accent1">
+                <a:shade val="50000"/>
+              </a:schemeClr>
+            </a:lnRef>
+            <a:fillRef idx="1">
+              <a:schemeClr val="accent1"/>
+            </a:fillRef>
+            <a:effectRef idx="0">
+              <a:schemeClr val="accent1"/>
+            </a:effectRef>
+            <a:fontRef idx="minor">
+              <a:schemeClr val="lt1"/>
+            </a:fontRef>
+          </p:style>
+          <p:txBody>
+            <a:bodyPr rtlCol="0" anchor="ctr"/>
+            <a:lstStyle/>
+            <a:p>
+              <a:pPr algn="ctr"/>
+              <a:endParaRPr lang="de-DE" sz="1200" dirty="0">
+                <a:solidFill>
+                  <a:schemeClr val="tx1"/>
+                </a:solidFill>
+              </a:endParaRPr>
+            </a:p>
+          </p:txBody>
+        </p:sp>
+        <p:sp>
+          <p:nvSpPr>
+            <p:cNvPr id="25" name="Cube 24">
+              <a:extLst>
+                <a:ext uri="{FF2B5EF4-FFF2-40B4-BE49-F238E27FC236}">
+                  <a16:creationId xmlns:a16="http://schemas.microsoft.com/office/drawing/2014/main" id="{9871DAE2-C80E-40D1-97A1-2D1CE2263068}"/>
+                </a:ext>
+              </a:extLst>
+            </p:cNvPr>
+            <p:cNvSpPr/>
+            <p:nvPr/>
+          </p:nvSpPr>
+          <p:spPr>
+            <a:xfrm>
+              <a:off x="2694792" y="3036237"/>
+              <a:ext cx="1008112" cy="1008112"/>
+            </a:xfrm>
+            <a:prstGeom prst="cube">
+              <a:avLst>
+                <a:gd name="adj" fmla="val 3695"/>
+              </a:avLst>
+            </a:prstGeom>
+            <a:ln w="15875"/>
+          </p:spPr>
+          <p:style>
+            <a:lnRef idx="2">
+              <a:schemeClr val="accent1">
+                <a:shade val="50000"/>
+              </a:schemeClr>
+            </a:lnRef>
+            <a:fillRef idx="1">
+              <a:schemeClr val="accent1"/>
+            </a:fillRef>
+            <a:effectRef idx="0">
+              <a:schemeClr val="accent1"/>
+            </a:effectRef>
+            <a:fontRef idx="minor">
+              <a:schemeClr val="lt1"/>
+            </a:fontRef>
+          </p:style>
+          <p:txBody>
+            <a:bodyPr rtlCol="0" anchor="ctr"/>
+            <a:lstStyle/>
+            <a:p>
+              <a:pPr algn="ctr"/>
+              <a:endParaRPr lang="de-DE" sz="1200" dirty="0">
+                <a:solidFill>
+                  <a:schemeClr val="tx1"/>
+                </a:solidFill>
+              </a:endParaRPr>
+            </a:p>
+          </p:txBody>
+        </p:sp>
+        <p:sp>
+          <p:nvSpPr>
+            <p:cNvPr id="26" name="Cube 25">
+              <a:extLst>
+                <a:ext uri="{FF2B5EF4-FFF2-40B4-BE49-F238E27FC236}">
+                  <a16:creationId xmlns:a16="http://schemas.microsoft.com/office/drawing/2014/main" id="{EB141CD0-7E99-4FF7-A6B3-4C644162F41B}"/>
+                </a:ext>
+              </a:extLst>
+            </p:cNvPr>
+            <p:cNvSpPr/>
+            <p:nvPr/>
+          </p:nvSpPr>
+          <p:spPr>
+            <a:xfrm>
+              <a:off x="2621785" y="3132727"/>
+              <a:ext cx="1008112" cy="1008112"/>
+            </a:xfrm>
+            <a:prstGeom prst="cube">
+              <a:avLst>
+                <a:gd name="adj" fmla="val 3695"/>
+              </a:avLst>
+            </a:prstGeom>
+            <a:ln w="15875"/>
+          </p:spPr>
+          <p:style>
+            <a:lnRef idx="2">
+              <a:schemeClr val="accent1">
+                <a:shade val="50000"/>
+              </a:schemeClr>
+            </a:lnRef>
+            <a:fillRef idx="1">
+              <a:schemeClr val="accent1"/>
+            </a:fillRef>
+            <a:effectRef idx="0">
+              <a:schemeClr val="accent1"/>
+            </a:effectRef>
+            <a:fontRef idx="minor">
+              <a:schemeClr val="lt1"/>
+            </a:fontRef>
+          </p:style>
+          <p:txBody>
+            <a:bodyPr rtlCol="0" anchor="ctr"/>
+            <a:lstStyle/>
+            <a:p>
+              <a:pPr algn="ctr"/>
+              <a:r>
+                <a:rPr lang="de-DE" sz="1200" dirty="0">
+                  <a:solidFill>
+                    <a:schemeClr val="tx1"/>
+                  </a:solidFill>
+                </a:rPr>
+                <a:t>2 Conv2D</a:t>
+              </a:r>
+            </a:p>
+            <a:p>
+              <a:pPr algn="ctr"/>
+              <a:r>
+                <a:rPr lang="de-DE" sz="1200" dirty="0" err="1">
+                  <a:solidFill>
+                    <a:schemeClr val="tx1"/>
+                  </a:solidFill>
+                </a:rPr>
+                <a:t>MaxPool</a:t>
+              </a:r>
+              <a:endParaRPr lang="de-DE" sz="1200" dirty="0">
+                <a:solidFill>
+                  <a:schemeClr val="tx1"/>
+                </a:solidFill>
+              </a:endParaRPr>
+            </a:p>
+            <a:p>
+              <a:pPr algn="ctr"/>
+              <a:r>
+                <a:rPr lang="de-DE" sz="1200" dirty="0">
+                  <a:solidFill>
+                    <a:schemeClr val="tx1"/>
+                  </a:solidFill>
+                </a:rPr>
+                <a:t>Dropout</a:t>
+              </a:r>
+            </a:p>
+          </p:txBody>
+        </p:sp>
+      </p:grpSp>
+      <p:grpSp>
+        <p:nvGrpSpPr>
+          <p:cNvPr id="28" name="Gruppieren 27">
+            <a:extLst>
+              <a:ext uri="{FF2B5EF4-FFF2-40B4-BE49-F238E27FC236}">
+                <a16:creationId xmlns:a16="http://schemas.microsoft.com/office/drawing/2014/main" id="{13F32D42-4C2C-4492-896C-BE418951B564}"/>
+              </a:ext>
+            </a:extLst>
+          </p:cNvPr>
+          <p:cNvGrpSpPr/>
+          <p:nvPr/>
+        </p:nvGrpSpPr>
+        <p:grpSpPr>
+          <a:xfrm>
+            <a:off x="4022004" y="3320716"/>
+            <a:ext cx="1225135" cy="1287998"/>
+            <a:chOff x="2621785" y="2852841"/>
+            <a:chExt cx="1225135" cy="1287998"/>
+          </a:xfrm>
+        </p:grpSpPr>
+        <p:sp>
+          <p:nvSpPr>
+            <p:cNvPr id="29" name="Cube 28">
+              <a:extLst>
+                <a:ext uri="{FF2B5EF4-FFF2-40B4-BE49-F238E27FC236}">
+                  <a16:creationId xmlns:a16="http://schemas.microsoft.com/office/drawing/2014/main" id="{17211398-9DC9-426C-B619-FA16D11EFAFC}"/>
+                </a:ext>
+              </a:extLst>
+            </p:cNvPr>
+            <p:cNvSpPr/>
+            <p:nvPr/>
+          </p:nvSpPr>
+          <p:spPr>
+            <a:xfrm>
+              <a:off x="2838808" y="2852841"/>
+              <a:ext cx="1008112" cy="1008112"/>
+            </a:xfrm>
+            <a:prstGeom prst="cube">
+              <a:avLst>
+                <a:gd name="adj" fmla="val 3695"/>
+              </a:avLst>
+            </a:prstGeom>
+            <a:ln w="15875"/>
+          </p:spPr>
+          <p:style>
+            <a:lnRef idx="2">
+              <a:schemeClr val="accent1">
+                <a:shade val="50000"/>
+              </a:schemeClr>
+            </a:lnRef>
+            <a:fillRef idx="1">
+              <a:schemeClr val="accent1"/>
+            </a:fillRef>
+            <a:effectRef idx="0">
+              <a:schemeClr val="accent1"/>
+            </a:effectRef>
+            <a:fontRef idx="minor">
+              <a:schemeClr val="lt1"/>
+            </a:fontRef>
+          </p:style>
+          <p:txBody>
+            <a:bodyPr rtlCol="0" anchor="ctr"/>
+            <a:lstStyle/>
+            <a:p>
+              <a:pPr algn="ctr"/>
+              <a:endParaRPr lang="de-DE" sz="1200" dirty="0">
+                <a:solidFill>
+                  <a:schemeClr val="tx1"/>
+                </a:solidFill>
+              </a:endParaRPr>
+            </a:p>
+          </p:txBody>
+        </p:sp>
+        <p:sp>
+          <p:nvSpPr>
+            <p:cNvPr id="30" name="Cube 29">
+              <a:extLst>
+                <a:ext uri="{FF2B5EF4-FFF2-40B4-BE49-F238E27FC236}">
+                  <a16:creationId xmlns:a16="http://schemas.microsoft.com/office/drawing/2014/main" id="{4164F294-1FC3-4FAF-9649-BEA7BF5B06BA}"/>
+                </a:ext>
+              </a:extLst>
+            </p:cNvPr>
+            <p:cNvSpPr/>
+            <p:nvPr/>
+          </p:nvSpPr>
+          <p:spPr>
+            <a:xfrm>
+              <a:off x="2766800" y="2937105"/>
+              <a:ext cx="1008112" cy="1008112"/>
+            </a:xfrm>
+            <a:prstGeom prst="cube">
+              <a:avLst>
+                <a:gd name="adj" fmla="val 3695"/>
+              </a:avLst>
+            </a:prstGeom>
+            <a:ln w="15875"/>
+          </p:spPr>
+          <p:style>
+            <a:lnRef idx="2">
+              <a:schemeClr val="accent1">
+                <a:shade val="50000"/>
+              </a:schemeClr>
+            </a:lnRef>
+            <a:fillRef idx="1">
+              <a:schemeClr val="accent1"/>
+            </a:fillRef>
+            <a:effectRef idx="0">
+              <a:schemeClr val="accent1"/>
+            </a:effectRef>
+            <a:fontRef idx="minor">
+              <a:schemeClr val="lt1"/>
+            </a:fontRef>
+          </p:style>
+          <p:txBody>
+            <a:bodyPr rtlCol="0" anchor="ctr"/>
+            <a:lstStyle/>
+            <a:p>
+              <a:pPr algn="ctr"/>
+              <a:endParaRPr lang="de-DE" sz="1200" dirty="0">
+                <a:solidFill>
+                  <a:schemeClr val="tx1"/>
+                </a:solidFill>
+              </a:endParaRPr>
+            </a:p>
+          </p:txBody>
+        </p:sp>
+        <p:sp>
+          <p:nvSpPr>
+            <p:cNvPr id="31" name="Cube 30">
+              <a:extLst>
+                <a:ext uri="{FF2B5EF4-FFF2-40B4-BE49-F238E27FC236}">
+                  <a16:creationId xmlns:a16="http://schemas.microsoft.com/office/drawing/2014/main" id="{D2351422-910F-481D-A93E-4DD9BBCFB444}"/>
+                </a:ext>
+              </a:extLst>
+            </p:cNvPr>
+            <p:cNvSpPr/>
+            <p:nvPr/>
+          </p:nvSpPr>
+          <p:spPr>
+            <a:xfrm>
+              <a:off x="2694792" y="3036237"/>
+              <a:ext cx="1008112" cy="1008112"/>
+            </a:xfrm>
+            <a:prstGeom prst="cube">
+              <a:avLst>
+                <a:gd name="adj" fmla="val 3695"/>
+              </a:avLst>
+            </a:prstGeom>
+            <a:ln w="15875"/>
+          </p:spPr>
+          <p:style>
+            <a:lnRef idx="2">
+              <a:schemeClr val="accent1">
+                <a:shade val="50000"/>
+              </a:schemeClr>
+            </a:lnRef>
+            <a:fillRef idx="1">
+              <a:schemeClr val="accent1"/>
+            </a:fillRef>
+            <a:effectRef idx="0">
+              <a:schemeClr val="accent1"/>
+            </a:effectRef>
+            <a:fontRef idx="minor">
+              <a:schemeClr val="lt1"/>
+            </a:fontRef>
+          </p:style>
+          <p:txBody>
+            <a:bodyPr rtlCol="0" anchor="ctr"/>
+            <a:lstStyle/>
+            <a:p>
+              <a:pPr algn="ctr"/>
+              <a:endParaRPr lang="de-DE" sz="1200" dirty="0">
+                <a:solidFill>
+                  <a:schemeClr val="tx1"/>
+                </a:solidFill>
+              </a:endParaRPr>
+            </a:p>
+          </p:txBody>
+        </p:sp>
+        <p:sp>
+          <p:nvSpPr>
+            <p:cNvPr id="32" name="Cube 31">
+              <a:extLst>
+                <a:ext uri="{FF2B5EF4-FFF2-40B4-BE49-F238E27FC236}">
+                  <a16:creationId xmlns:a16="http://schemas.microsoft.com/office/drawing/2014/main" id="{5F7FCED5-063A-47AB-9A1A-529D1E87D76F}"/>
+                </a:ext>
+              </a:extLst>
+            </p:cNvPr>
+            <p:cNvSpPr/>
+            <p:nvPr/>
+          </p:nvSpPr>
+          <p:spPr>
+            <a:xfrm>
+              <a:off x="2621785" y="3132727"/>
+              <a:ext cx="1008112" cy="1008112"/>
+            </a:xfrm>
+            <a:prstGeom prst="cube">
+              <a:avLst>
+                <a:gd name="adj" fmla="val 3695"/>
+              </a:avLst>
+            </a:prstGeom>
+            <a:ln w="15875"/>
+          </p:spPr>
+          <p:style>
+            <a:lnRef idx="2">
+              <a:schemeClr val="accent1">
+                <a:shade val="50000"/>
+              </a:schemeClr>
+            </a:lnRef>
+            <a:fillRef idx="1">
+              <a:schemeClr val="accent1"/>
+            </a:fillRef>
+            <a:effectRef idx="0">
+              <a:schemeClr val="accent1"/>
+            </a:effectRef>
+            <a:fontRef idx="minor">
+              <a:schemeClr val="lt1"/>
+            </a:fontRef>
+          </p:style>
+          <p:txBody>
+            <a:bodyPr rtlCol="0" anchor="ctr"/>
+            <a:lstStyle/>
+            <a:p>
+              <a:pPr algn="ctr"/>
+              <a:r>
+                <a:rPr lang="de-DE" sz="1200" dirty="0">
+                  <a:solidFill>
+                    <a:schemeClr val="tx1"/>
+                  </a:solidFill>
+                </a:rPr>
+                <a:t>2 Conv2D</a:t>
+              </a:r>
+            </a:p>
+            <a:p>
+              <a:pPr algn="ctr"/>
+              <a:r>
+                <a:rPr lang="de-DE" sz="1200" dirty="0" err="1">
+                  <a:solidFill>
+                    <a:schemeClr val="tx1"/>
+                  </a:solidFill>
+                </a:rPr>
+                <a:t>MaxPool</a:t>
+              </a:r>
+              <a:endParaRPr lang="de-DE" sz="1200" dirty="0">
+                <a:solidFill>
+                  <a:schemeClr val="tx1"/>
+                </a:solidFill>
+              </a:endParaRPr>
+            </a:p>
+            <a:p>
+              <a:pPr algn="ctr"/>
+              <a:r>
+                <a:rPr lang="de-DE" sz="1200" dirty="0">
+                  <a:solidFill>
+                    <a:schemeClr val="tx1"/>
+                  </a:solidFill>
+                </a:rPr>
+                <a:t>Dropout</a:t>
+              </a:r>
+            </a:p>
+          </p:txBody>
+        </p:sp>
+      </p:grpSp>
+      <p:sp>
+        <p:nvSpPr>
+          <p:cNvPr id="33" name="Pfeil: nach rechts 32">
+            <a:extLst>
+              <a:ext uri="{FF2B5EF4-FFF2-40B4-BE49-F238E27FC236}">
+                <a16:creationId xmlns:a16="http://schemas.microsoft.com/office/drawing/2014/main" id="{2E89B8A6-4A50-4592-B0F8-07932B65D26C}"/>
+              </a:ext>
+            </a:extLst>
+          </p:cNvPr>
+          <p:cNvSpPr/>
+          <p:nvPr/>
+        </p:nvSpPr>
+        <p:spPr>
+          <a:xfrm>
+            <a:off x="3616457" y="4008168"/>
+            <a:ext cx="369043" cy="256794"/>
+          </a:xfrm>
+          <a:prstGeom prst="rightArrow">
+            <a:avLst/>
+          </a:prstGeom>
+          <a:solidFill>
+            <a:schemeClr val="tx1"/>
+          </a:solidFill>
+          <a:ln>
+            <a:solidFill>
+              <a:schemeClr val="tx1"/>
+            </a:solidFill>
+          </a:ln>
+        </p:spPr>
+        <p:style>
+          <a:lnRef idx="2">
+            <a:schemeClr val="accent1">
+              <a:shade val="50000"/>
+            </a:schemeClr>
+          </a:lnRef>
+          <a:fillRef idx="1">
+            <a:schemeClr val="accent1"/>
+          </a:fillRef>
+          <a:effectRef idx="0">
+            <a:schemeClr val="accent1"/>
+          </a:effectRef>
+          <a:fontRef idx="minor">
+            <a:schemeClr val="lt1"/>
+          </a:fontRef>
+        </p:style>
+        <p:txBody>
+          <a:bodyPr rtlCol="0" anchor="ctr"/>
+          <a:lstStyle/>
+          <a:p>
+            <a:pPr algn="ctr"/>
+            <a:endParaRPr lang="de-DE"/>
+          </a:p>
+        </p:txBody>
+      </p:sp>
+      <p:sp>
+        <p:nvSpPr>
+          <p:cNvPr id="34" name="Pfeil: nach rechts 33">
+            <a:extLst>
+              <a:ext uri="{FF2B5EF4-FFF2-40B4-BE49-F238E27FC236}">
+                <a16:creationId xmlns:a16="http://schemas.microsoft.com/office/drawing/2014/main" id="{414A466E-CC45-462D-8FA7-180BBC04918C}"/>
+              </a:ext>
+            </a:extLst>
+          </p:cNvPr>
+          <p:cNvSpPr/>
+          <p:nvPr/>
+        </p:nvSpPr>
+        <p:spPr>
+          <a:xfrm>
+            <a:off x="5185288" y="3875823"/>
+            <a:ext cx="369043" cy="256794"/>
+          </a:xfrm>
+          <a:prstGeom prst="rightArrow">
+            <a:avLst/>
+          </a:prstGeom>
+          <a:solidFill>
+            <a:schemeClr val="tx1"/>
+          </a:solidFill>
+          <a:ln>
+            <a:solidFill>
+              <a:schemeClr val="tx1"/>
+            </a:solidFill>
+          </a:ln>
+        </p:spPr>
+        <p:style>
+          <a:lnRef idx="2">
+            <a:schemeClr val="accent1">
+              <a:shade val="50000"/>
+            </a:schemeClr>
+          </a:lnRef>
+          <a:fillRef idx="1">
+            <a:schemeClr val="accent1"/>
+          </a:fillRef>
+          <a:effectRef idx="0">
+            <a:schemeClr val="accent1"/>
+          </a:effectRef>
+          <a:fontRef idx="minor">
+            <a:schemeClr val="lt1"/>
+          </a:fontRef>
+        </p:style>
+        <p:txBody>
+          <a:bodyPr rtlCol="0" anchor="ctr"/>
+          <a:lstStyle/>
+          <a:p>
+            <a:pPr algn="ctr"/>
+            <a:endParaRPr lang="de-DE"/>
+          </a:p>
+        </p:txBody>
+      </p:sp>
+      <p:sp>
+        <p:nvSpPr>
+          <p:cNvPr id="35" name="Pfeil: nach rechts 34">
+            <a:extLst>
+              <a:ext uri="{FF2B5EF4-FFF2-40B4-BE49-F238E27FC236}">
+                <a16:creationId xmlns:a16="http://schemas.microsoft.com/office/drawing/2014/main" id="{A155E773-A753-432F-A383-A474A27323CE}"/>
+              </a:ext>
+            </a:extLst>
+          </p:cNvPr>
+          <p:cNvSpPr/>
+          <p:nvPr/>
+        </p:nvSpPr>
+        <p:spPr>
+          <a:xfrm>
+            <a:off x="6240250" y="3875822"/>
+            <a:ext cx="299534" cy="228835"/>
+          </a:xfrm>
+          <a:prstGeom prst="rightArrow">
+            <a:avLst/>
+          </a:prstGeom>
+          <a:solidFill>
+            <a:schemeClr val="tx1"/>
+          </a:solidFill>
+          <a:ln>
+            <a:solidFill>
+              <a:schemeClr val="tx1"/>
+            </a:solidFill>
+          </a:ln>
+        </p:spPr>
+        <p:style>
+          <a:lnRef idx="2">
+            <a:schemeClr val="accent1">
+              <a:shade val="50000"/>
+            </a:schemeClr>
+          </a:lnRef>
+          <a:fillRef idx="1">
+            <a:schemeClr val="accent1"/>
+          </a:fillRef>
+          <a:effectRef idx="0">
+            <a:schemeClr val="accent1"/>
+          </a:effectRef>
+          <a:fontRef idx="minor">
+            <a:schemeClr val="lt1"/>
+          </a:fontRef>
+        </p:style>
+        <p:txBody>
+          <a:bodyPr rtlCol="0" anchor="ctr"/>
+          <a:lstStyle/>
+          <a:p>
+            <a:pPr algn="ctr"/>
+            <a:endParaRPr lang="de-DE"/>
+          </a:p>
+        </p:txBody>
+      </p:sp>
+      <p:cxnSp>
+        <p:nvCxnSpPr>
+          <p:cNvPr id="38" name="Gerade Verbindung mit Pfeil 37">
+            <a:extLst>
+              <a:ext uri="{FF2B5EF4-FFF2-40B4-BE49-F238E27FC236}">
+                <a16:creationId xmlns:a16="http://schemas.microsoft.com/office/drawing/2014/main" id="{BEB6490E-A016-4076-A79D-D7D6F2BDACC0}"/>
+              </a:ext>
+            </a:extLst>
+          </p:cNvPr>
+          <p:cNvCxnSpPr>
+            <a:stCxn id="10" idx="5"/>
+          </p:cNvCxnSpPr>
+          <p:nvPr/>
+        </p:nvCxnSpPr>
+        <p:spPr>
+          <a:xfrm flipV="1">
+            <a:off x="7187855" y="3687697"/>
+            <a:ext cx="358538" cy="235492"/>
+          </a:xfrm>
+          <a:prstGeom prst="straightConnector1">
+            <a:avLst/>
+          </a:prstGeom>
+          <a:ln>
+            <a:solidFill>
+              <a:schemeClr val="tx1"/>
+            </a:solidFill>
+            <a:tailEnd type="triangle"/>
+          </a:ln>
+        </p:spPr>
+        <p:style>
+          <a:lnRef idx="1">
+            <a:schemeClr val="accent1"/>
+          </a:lnRef>
+          <a:fillRef idx="0">
+            <a:schemeClr val="accent1"/>
+          </a:fillRef>
+          <a:effectRef idx="0">
+            <a:schemeClr val="accent1"/>
+          </a:effectRef>
+          <a:fontRef idx="minor">
+            <a:schemeClr val="tx1"/>
+          </a:fontRef>
+        </p:style>
+      </p:cxnSp>
+      <p:cxnSp>
+        <p:nvCxnSpPr>
+          <p:cNvPr id="40" name="Gerade Verbindung mit Pfeil 39">
+            <a:extLst>
+              <a:ext uri="{FF2B5EF4-FFF2-40B4-BE49-F238E27FC236}">
+                <a16:creationId xmlns:a16="http://schemas.microsoft.com/office/drawing/2014/main" id="{DE0CF967-0D5C-4A36-9B7E-3BBBBFA6FAA8}"/>
+              </a:ext>
+            </a:extLst>
+          </p:cNvPr>
+          <p:cNvCxnSpPr>
+            <a:stCxn id="10" idx="5"/>
+          </p:cNvCxnSpPr>
+          <p:nvPr/>
+        </p:nvCxnSpPr>
+        <p:spPr>
+          <a:xfrm>
+            <a:off x="7187855" y="3923189"/>
+            <a:ext cx="358538" cy="209428"/>
+          </a:xfrm>
+          <a:prstGeom prst="straightConnector1">
+            <a:avLst/>
+          </a:prstGeom>
+          <a:ln>
+            <a:solidFill>
+              <a:schemeClr val="tx1"/>
+            </a:solidFill>
+            <a:tailEnd type="triangle"/>
+          </a:ln>
+        </p:spPr>
+        <p:style>
+          <a:lnRef idx="1">
+            <a:schemeClr val="accent1"/>
+          </a:lnRef>
+          <a:fillRef idx="0">
+            <a:schemeClr val="accent1"/>
+          </a:fillRef>
+          <a:effectRef idx="0">
+            <a:schemeClr val="accent1"/>
+          </a:effectRef>
+          <a:fontRef idx="minor">
+            <a:schemeClr val="tx1"/>
+          </a:fontRef>
+        </p:style>
+      </p:cxnSp>
+      <p:sp>
+        <p:nvSpPr>
+          <p:cNvPr id="41" name="Textfeld 40">
+            <a:extLst>
+              <a:ext uri="{FF2B5EF4-FFF2-40B4-BE49-F238E27FC236}">
+                <a16:creationId xmlns:a16="http://schemas.microsoft.com/office/drawing/2014/main" id="{0744199B-EE29-4B63-8A84-061B1447AD55}"/>
+              </a:ext>
+            </a:extLst>
+          </p:cNvPr>
+          <p:cNvSpPr txBox="1"/>
+          <p:nvPr/>
+        </p:nvSpPr>
+        <p:spPr>
+          <a:xfrm>
+            <a:off x="7605468" y="3503031"/>
+            <a:ext cx="819455" cy="369332"/>
+          </a:xfrm>
+          <a:prstGeom prst="rect">
+            <a:avLst/>
+          </a:prstGeom>
+          <a:noFill/>
+        </p:spPr>
+        <p:txBody>
+          <a:bodyPr wrap="none" rtlCol="0">
+            <a:spAutoFit/>
+          </a:bodyPr>
+          <a:lstStyle/>
+          <a:p>
+            <a:r>
+              <a:rPr lang="de-DE" dirty="0"/>
+              <a:t>Finger</a:t>
+            </a:r>
+          </a:p>
+        </p:txBody>
+      </p:sp>
+      <p:sp>
+        <p:nvSpPr>
+          <p:cNvPr id="42" name="Textfeld 41">
+            <a:extLst>
+              <a:ext uri="{FF2B5EF4-FFF2-40B4-BE49-F238E27FC236}">
+                <a16:creationId xmlns:a16="http://schemas.microsoft.com/office/drawing/2014/main" id="{1A7EC548-30A6-4D63-B523-64C074D8C070}"/>
+              </a:ext>
+            </a:extLst>
+          </p:cNvPr>
+          <p:cNvSpPr txBox="1"/>
+          <p:nvPr/>
+        </p:nvSpPr>
+        <p:spPr>
+          <a:xfrm>
+            <a:off x="7605467" y="3947951"/>
+            <a:ext cx="978153" cy="369332"/>
+          </a:xfrm>
+          <a:prstGeom prst="rect">
+            <a:avLst/>
+          </a:prstGeom>
+          <a:noFill/>
+        </p:spPr>
+        <p:txBody>
+          <a:bodyPr wrap="none" rtlCol="0">
+            <a:spAutoFit/>
+          </a:bodyPr>
+          <a:lstStyle/>
+          <a:p>
+            <a:r>
+              <a:rPr lang="de-DE" dirty="0" err="1"/>
+              <a:t>Knuckle</a:t>
+            </a:r>
+            <a:endParaRPr lang="de-DE" dirty="0"/>
+          </a:p>
+        </p:txBody>
+      </p:sp>
+      <p:sp>
+        <p:nvSpPr>
+          <p:cNvPr id="43" name="Pfeil: nach rechts 42">
+            <a:extLst>
+              <a:ext uri="{FF2B5EF4-FFF2-40B4-BE49-F238E27FC236}">
+                <a16:creationId xmlns:a16="http://schemas.microsoft.com/office/drawing/2014/main" id="{BF3E465F-D48B-477F-8E6F-4CE34CCDFDAE}"/>
+              </a:ext>
+            </a:extLst>
+          </p:cNvPr>
+          <p:cNvSpPr/>
+          <p:nvPr/>
+        </p:nvSpPr>
+        <p:spPr>
+          <a:xfrm>
+            <a:off x="2173262" y="4001982"/>
+            <a:ext cx="369043" cy="256794"/>
+          </a:xfrm>
+          <a:prstGeom prst="rightArrow">
+            <a:avLst/>
+          </a:prstGeom>
+          <a:solidFill>
+            <a:schemeClr val="tx1"/>
+          </a:solidFill>
+          <a:ln>
+            <a:solidFill>
+              <a:schemeClr val="tx1"/>
+            </a:solidFill>
+          </a:ln>
+        </p:spPr>
+        <p:style>
+          <a:lnRef idx="2">
+            <a:schemeClr val="accent1">
+              <a:shade val="50000"/>
+            </a:schemeClr>
+          </a:lnRef>
+          <a:fillRef idx="1">
+            <a:schemeClr val="accent1"/>
+          </a:fillRef>
+          <a:effectRef idx="0">
+            <a:schemeClr val="accent1"/>
+          </a:effectRef>
+          <a:fontRef idx="minor">
+            <a:schemeClr val="lt1"/>
+          </a:fontRef>
+        </p:style>
+        <p:txBody>
+          <a:bodyPr rtlCol="0" anchor="ctr"/>
+          <a:lstStyle/>
+          <a:p>
+            <a:pPr algn="ctr"/>
+            <a:endParaRPr lang="de-DE"/>
+          </a:p>
+        </p:txBody>
+      </p:sp>
+      <p:pic>
+        <p:nvPicPr>
+          <p:cNvPr id="44" name="Grafik 43">
+            <a:extLst>
+              <a:ext uri="{FF2B5EF4-FFF2-40B4-BE49-F238E27FC236}">
+                <a16:creationId xmlns:a16="http://schemas.microsoft.com/office/drawing/2014/main" id="{2B874E9F-2390-4FFF-9D95-9FBF6CA26317}"/>
+              </a:ext>
+            </a:extLst>
+          </p:cNvPr>
+          <p:cNvPicPr>
+            <a:picLocks noChangeAspect="1"/>
+          </p:cNvPicPr>
+          <p:nvPr/>
+        </p:nvPicPr>
+        <p:blipFill>
+          <a:blip r:embed="rId5" cstate="print">
+            <a:extLst>
+              <a:ext uri="{28A0092B-C50C-407E-A947-70E740481C1C}">
+                <a14:useLocalDpi xmlns:a14="http://schemas.microsoft.com/office/drawing/2010/main" val="0"/>
+              </a:ext>
+            </a:extLst>
+          </a:blip>
+          <a:stretch>
+            <a:fillRect/>
+          </a:stretch>
+        </p:blipFill>
+        <p:spPr>
+          <a:xfrm>
+            <a:off x="1442778" y="3543437"/>
+            <a:ext cx="661785" cy="1122440"/>
+          </a:xfrm>
+          <a:prstGeom prst="rect">
+            <a:avLst/>
+          </a:prstGeom>
+        </p:spPr>
+      </p:pic>
     </p:spTree>
     <p:extLst>
       <p:ext uri="{BB962C8B-B14F-4D97-AF65-F5344CB8AC3E}">
@@ -4458,50 +5884,10 @@
       </p:grpSpPr>
       <p:sp>
         <p:nvSpPr>
-          <p:cNvPr id="2" name="Inhaltsplatzhalter 1">
+          <p:cNvPr id="3" name="Foliennummernplatzhalter 2">
             <a:extLst>
               <a:ext uri="{FF2B5EF4-FFF2-40B4-BE49-F238E27FC236}">
-                <a16:creationId xmlns:a16="http://schemas.microsoft.com/office/drawing/2014/main" id="{BBDEB313-80BE-42A6-876F-E892E7589C83}"/>
-              </a:ext>
-            </a:extLst>
-          </p:cNvPr>
-          <p:cNvSpPr>
-            <a:spLocks noGrp="1"/>
-          </p:cNvSpPr>
-          <p:nvPr>
-            <p:ph idx="1"/>
-          </p:nvPr>
-        </p:nvSpPr>
-        <p:spPr/>
-        <p:txBody>
-          <a:bodyPr/>
-          <a:lstStyle/>
-          <a:p>
-            <a:r>
-              <a:rPr lang="en-GB" dirty="0"/>
-              <a:t>Use same blob detection</a:t>
-            </a:r>
-          </a:p>
-          <a:p>
-            <a:r>
-              <a:rPr lang="en-GB" dirty="0"/>
-              <a:t>Add up all blobs</a:t>
-            </a:r>
-          </a:p>
-          <a:p>
-            <a:r>
-              <a:rPr lang="en-GB" dirty="0"/>
-              <a:t>Then use CNN for classification</a:t>
-            </a:r>
-          </a:p>
-        </p:txBody>
-      </p:sp>
-      <p:sp>
-        <p:nvSpPr>
-          <p:cNvPr id="3" name="Foliennummernplatzhalter 2">
-            <a:extLst>
-              <a:ext uri="{FF2B5EF4-FFF2-40B4-BE49-F238E27FC236}">
-                <a16:creationId xmlns:a16="http://schemas.microsoft.com/office/drawing/2014/main" id="{45FDC699-C2A0-4921-BD9D-330BF42AFE41}"/>
+                <a16:creationId xmlns:a16="http://schemas.microsoft.com/office/drawing/2014/main" id="{C75CBF3F-4A85-4DB6-A8C3-35B699CD3955}"/>
               </a:ext>
             </a:extLst>
           </p:cNvPr>
@@ -4530,7 +5916,7 @@
           <p:cNvPr id="4" name="Titel 3">
             <a:extLst>
               <a:ext uri="{FF2B5EF4-FFF2-40B4-BE49-F238E27FC236}">
-                <a16:creationId xmlns:a16="http://schemas.microsoft.com/office/drawing/2014/main" id="{60B01397-2CC6-4F47-ABD1-3984BD598D97}"/>
+                <a16:creationId xmlns:a16="http://schemas.microsoft.com/office/drawing/2014/main" id="{D492C1AC-304C-4F16-B71D-6EBD578D2C00}"/>
               </a:ext>
             </a:extLst>
           </p:cNvPr>
@@ -4541,28 +5927,92 @@
             <p:ph type="title"/>
           </p:nvPr>
         </p:nvSpPr>
+        <p:spPr/>
+        <p:txBody>
+          <a:bodyPr/>
+          <a:lstStyle/>
+          <a:p>
+            <a:r>
+              <a:rPr lang="en-GB" dirty="0"/>
+              <a:t>Step 2 – Finger/Knuckle Recognition</a:t>
+            </a:r>
+            <a:endParaRPr lang="de-DE" dirty="0"/>
+          </a:p>
+        </p:txBody>
+      </p:sp>
+      <p:pic>
+        <p:nvPicPr>
+          <p:cNvPr id="5" name="Grafik 4" descr="Häkchen">
+            <a:extLst>
+              <a:ext uri="{FF2B5EF4-FFF2-40B4-BE49-F238E27FC236}">
+                <a16:creationId xmlns:a16="http://schemas.microsoft.com/office/drawing/2014/main" id="{3D9C5C0E-ED91-4271-AE33-09CBC1CA9162}"/>
+              </a:ext>
+            </a:extLst>
+          </p:cNvPr>
+          <p:cNvPicPr>
+            <a:picLocks noChangeAspect="1"/>
+          </p:cNvPicPr>
+          <p:nvPr/>
+        </p:nvPicPr>
+        <p:blipFill>
+          <a:blip r:embed="rId2">
+            <a:extLst>
+              <a:ext uri="{28A0092B-C50C-407E-A947-70E740481C1C}">
+                <a14:useLocalDpi xmlns:a14="http://schemas.microsoft.com/office/drawing/2010/main" val="0"/>
+              </a:ext>
+              <a:ext uri="{96DAC541-7B7A-43D3-8B79-37D633B846F1}">
+                <asvg:svgBlip xmlns:asvg="http://schemas.microsoft.com/office/drawing/2016/SVG/main" r:embed="rId3"/>
+              </a:ext>
+            </a:extLst>
+          </a:blip>
+          <a:stretch>
+            <a:fillRect/>
+          </a:stretch>
+        </p:blipFill>
         <p:spPr>
           <a:xfrm>
-            <a:off x="251520" y="171451"/>
-            <a:ext cx="8928992" cy="820625"/>
-          </a:xfrm>
+            <a:off x="7499176" y="171451"/>
+            <a:ext cx="817240" cy="817240"/>
+          </a:xfrm>
+          <a:prstGeom prst="rect">
+            <a:avLst/>
+          </a:prstGeom>
         </p:spPr>
-        <p:txBody>
-          <a:bodyPr/>
-          <a:lstStyle/>
-          <a:p>
-            <a:r>
-              <a:rPr lang="en-GB" dirty="0"/>
-              <a:t>Step 3 - Gesture recognition – First Approach</a:t>
-            </a:r>
-            <a:endParaRPr lang="en-DE" dirty="0"/>
-          </a:p>
-        </p:txBody>
-      </p:sp>
+      </p:pic>
+      <p:pic>
+        <p:nvPicPr>
+          <p:cNvPr id="6" name="Grafik 5">
+            <a:extLst>
+              <a:ext uri="{FF2B5EF4-FFF2-40B4-BE49-F238E27FC236}">
+                <a16:creationId xmlns:a16="http://schemas.microsoft.com/office/drawing/2014/main" id="{06BF3FEA-8D7E-432C-AE29-73A89A8FF1A0}"/>
+              </a:ext>
+            </a:extLst>
+          </p:cNvPr>
+          <p:cNvPicPr>
+            <a:picLocks noChangeAspect="1"/>
+          </p:cNvPicPr>
+          <p:nvPr/>
+        </p:nvPicPr>
+        <p:blipFill>
+          <a:blip r:embed="rId4"/>
+          <a:stretch>
+            <a:fillRect/>
+          </a:stretch>
+        </p:blipFill>
+        <p:spPr>
+          <a:xfrm>
+            <a:off x="1619672" y="1223325"/>
+            <a:ext cx="4934285" cy="3311251"/>
+          </a:xfrm>
+          <a:prstGeom prst="rect">
+            <a:avLst/>
+          </a:prstGeom>
+        </p:spPr>
+      </p:pic>
     </p:spTree>
     <p:extLst>
       <p:ext uri="{BB962C8B-B14F-4D97-AF65-F5344CB8AC3E}">
-        <p14:creationId xmlns:p14="http://schemas.microsoft.com/office/powerpoint/2010/main" val="2616312968"/>
+        <p14:creationId xmlns:p14="http://schemas.microsoft.com/office/powerpoint/2010/main" val="1002846350"/>
       </p:ext>
     </p:extLst>
   </p:cSld>
@@ -4594,7 +6044,7 @@
           <p:cNvPr id="3" name="Foliennummernplatzhalter 2">
             <a:extLst>
               <a:ext uri="{FF2B5EF4-FFF2-40B4-BE49-F238E27FC236}">
-                <a16:creationId xmlns:a16="http://schemas.microsoft.com/office/drawing/2014/main" id="{A0AD3461-D246-4240-B04A-3B49916BE50E}"/>
+                <a16:creationId xmlns:a16="http://schemas.microsoft.com/office/drawing/2014/main" id="{C75CBF3F-4A85-4DB6-A8C3-35B699CD3955}"/>
               </a:ext>
             </a:extLst>
           </p:cNvPr>
@@ -4623,7 +6073,7 @@
           <p:cNvPr id="4" name="Titel 3">
             <a:extLst>
               <a:ext uri="{FF2B5EF4-FFF2-40B4-BE49-F238E27FC236}">
-                <a16:creationId xmlns:a16="http://schemas.microsoft.com/office/drawing/2014/main" id="{9F31D83D-1764-4D98-8916-75B26B305D1C}"/>
+                <a16:creationId xmlns:a16="http://schemas.microsoft.com/office/drawing/2014/main" id="{D492C1AC-304C-4F16-B71D-6EBD578D2C00}"/>
               </a:ext>
             </a:extLst>
           </p:cNvPr>
@@ -4634,29 +6084,25 @@
             <p:ph type="title"/>
           </p:nvPr>
         </p:nvSpPr>
-        <p:spPr>
-          <a:xfrm>
-            <a:off x="251520" y="171451"/>
-            <a:ext cx="9001000" cy="820625"/>
-          </a:xfrm>
-        </p:spPr>
+        <p:spPr/>
         <p:txBody>
           <a:bodyPr/>
           <a:lstStyle/>
           <a:p>
             <a:r>
               <a:rPr lang="en-GB" dirty="0"/>
-              <a:t>Step 3- Gesture recognition – First Approach</a:t>
-            </a:r>
+              <a:t>Step 2 – Finger/Knuckle Recognition</a:t>
+            </a:r>
+            <a:endParaRPr lang="de-DE" dirty="0"/>
           </a:p>
         </p:txBody>
       </p:sp>
       <p:pic>
         <p:nvPicPr>
-          <p:cNvPr id="6" name="Grafik 5">
+          <p:cNvPr id="5" name="Grafik 4" descr="Häkchen">
             <a:extLst>
               <a:ext uri="{FF2B5EF4-FFF2-40B4-BE49-F238E27FC236}">
-                <a16:creationId xmlns:a16="http://schemas.microsoft.com/office/drawing/2014/main" id="{142D84E6-734B-427D-8E62-F9677FF9BE42}"/>
+                <a16:creationId xmlns:a16="http://schemas.microsoft.com/office/drawing/2014/main" id="{3D9C5C0E-ED91-4271-AE33-09CBC1CA9162}"/>
               </a:ext>
             </a:extLst>
           </p:cNvPr>
@@ -4671,6 +6117,9 @@
               <a:ext uri="{28A0092B-C50C-407E-A947-70E740481C1C}">
                 <a14:useLocalDpi xmlns:a14="http://schemas.microsoft.com/office/drawing/2010/main" val="0"/>
               </a:ext>
+              <a:ext uri="{96DAC541-7B7A-43D3-8B79-37D633B846F1}">
+                <asvg:svgBlip xmlns:asvg="http://schemas.microsoft.com/office/drawing/2016/SVG/main" r:embed="rId3"/>
+              </a:ext>
             </a:extLst>
           </a:blip>
           <a:stretch>
@@ -4679,8 +6128,8 @@
         </p:blipFill>
         <p:spPr>
           <a:xfrm>
-            <a:off x="6516218" y="1142818"/>
-            <a:ext cx="1900731" cy="3147541"/>
+            <a:off x="7499176" y="171451"/>
+            <a:ext cx="817240" cy="817240"/>
           </a:xfrm>
           <a:prstGeom prst="rect">
             <a:avLst/>
@@ -4689,10 +6138,10 @@
       </p:pic>
       <p:pic>
         <p:nvPicPr>
-          <p:cNvPr id="8" name="Grafik 7">
+          <p:cNvPr id="7" name="Grafik 6">
             <a:extLst>
               <a:ext uri="{FF2B5EF4-FFF2-40B4-BE49-F238E27FC236}">
-                <a16:creationId xmlns:a16="http://schemas.microsoft.com/office/drawing/2014/main" id="{72C5A5FA-97E5-46A2-896E-431BD1D571CB}"/>
+                <a16:creationId xmlns:a16="http://schemas.microsoft.com/office/drawing/2014/main" id="{3984938C-2EE2-4BA1-BFA8-1E795D27C643}"/>
               </a:ext>
             </a:extLst>
           </p:cNvPr>
@@ -4702,93 +6151,15 @@
           <p:nvPr/>
         </p:nvPicPr>
         <p:blipFill>
-          <a:blip r:embed="rId3">
-            <a:extLst>
-              <a:ext uri="{28A0092B-C50C-407E-A947-70E740481C1C}">
-                <a14:useLocalDpi xmlns:a14="http://schemas.microsoft.com/office/drawing/2010/main" val="0"/>
-              </a:ext>
-            </a:extLst>
-          </a:blip>
+          <a:blip r:embed="rId4"/>
           <a:stretch>
             <a:fillRect/>
           </a:stretch>
         </p:blipFill>
         <p:spPr>
           <a:xfrm>
-            <a:off x="287524" y="1142818"/>
-            <a:ext cx="1900731" cy="3147542"/>
-          </a:xfrm>
-          <a:prstGeom prst="rect">
-            <a:avLst/>
-          </a:prstGeom>
-        </p:spPr>
-      </p:pic>
-      <p:pic>
-        <p:nvPicPr>
-          <p:cNvPr id="10" name="Grafik 9">
-            <a:extLst>
-              <a:ext uri="{FF2B5EF4-FFF2-40B4-BE49-F238E27FC236}">
-                <a16:creationId xmlns:a16="http://schemas.microsoft.com/office/drawing/2014/main" id="{754CD845-6716-4671-9749-E22708B0270E}"/>
-              </a:ext>
-            </a:extLst>
-          </p:cNvPr>
-          <p:cNvPicPr>
-            <a:picLocks noChangeAspect="1"/>
-          </p:cNvPicPr>
-          <p:nvPr/>
-        </p:nvPicPr>
-        <p:blipFill>
-          <a:blip r:embed="rId4">
-            <a:extLst>
-              <a:ext uri="{28A0092B-C50C-407E-A947-70E740481C1C}">
-                <a14:useLocalDpi xmlns:a14="http://schemas.microsoft.com/office/drawing/2010/main" val="0"/>
-              </a:ext>
-            </a:extLst>
-          </a:blip>
-          <a:stretch>
-            <a:fillRect/>
-          </a:stretch>
-        </p:blipFill>
-        <p:spPr>
-          <a:xfrm>
-            <a:off x="2339752" y="1142818"/>
-            <a:ext cx="1900731" cy="3147542"/>
-          </a:xfrm>
-          <a:prstGeom prst="rect">
-            <a:avLst/>
-          </a:prstGeom>
-        </p:spPr>
-      </p:pic>
-      <p:pic>
-        <p:nvPicPr>
-          <p:cNvPr id="12" name="Grafik 11">
-            <a:extLst>
-              <a:ext uri="{FF2B5EF4-FFF2-40B4-BE49-F238E27FC236}">
-                <a16:creationId xmlns:a16="http://schemas.microsoft.com/office/drawing/2014/main" id="{CB38C1D1-4CDC-44D1-9D2C-0EF15591C217}"/>
-              </a:ext>
-            </a:extLst>
-          </p:cNvPr>
-          <p:cNvPicPr>
-            <a:picLocks noChangeAspect="1"/>
-          </p:cNvPicPr>
-          <p:nvPr/>
-        </p:nvPicPr>
-        <p:blipFill>
-          <a:blip r:embed="rId5">
-            <a:extLst>
-              <a:ext uri="{28A0092B-C50C-407E-A947-70E740481C1C}">
-                <a14:useLocalDpi xmlns:a14="http://schemas.microsoft.com/office/drawing/2010/main" val="0"/>
-              </a:ext>
-            </a:extLst>
-          </a:blip>
-          <a:stretch>
-            <a:fillRect/>
-          </a:stretch>
-        </p:blipFill>
-        <p:spPr>
-          <a:xfrm>
-            <a:off x="4427985" y="1142819"/>
-            <a:ext cx="1900731" cy="3147541"/>
+            <a:off x="1418158" y="1275606"/>
+            <a:ext cx="6119672" cy="2831189"/>
           </a:xfrm>
           <a:prstGeom prst="rect">
             <a:avLst/>
@@ -4798,7 +6169,7 @@
     </p:spTree>
     <p:extLst>
       <p:ext uri="{BB962C8B-B14F-4D97-AF65-F5344CB8AC3E}">
-        <p14:creationId xmlns:p14="http://schemas.microsoft.com/office/powerpoint/2010/main" val="3016737685"/>
+        <p14:creationId xmlns:p14="http://schemas.microsoft.com/office/powerpoint/2010/main" val="4275409732"/>
       </p:ext>
     </p:extLst>
   </p:cSld>
@@ -4827,10 +6198,50 @@
       </p:grpSpPr>
       <p:sp>
         <p:nvSpPr>
+          <p:cNvPr id="2" name="Inhaltsplatzhalter 1">
+            <a:extLst>
+              <a:ext uri="{FF2B5EF4-FFF2-40B4-BE49-F238E27FC236}">
+                <a16:creationId xmlns:a16="http://schemas.microsoft.com/office/drawing/2014/main" id="{BBDEB313-80BE-42A6-876F-E892E7589C83}"/>
+              </a:ext>
+            </a:extLst>
+          </p:cNvPr>
+          <p:cNvSpPr>
+            <a:spLocks noGrp="1"/>
+          </p:cNvSpPr>
+          <p:nvPr>
+            <p:ph idx="1"/>
+          </p:nvPr>
+        </p:nvSpPr>
+        <p:spPr/>
+        <p:txBody>
+          <a:bodyPr/>
+          <a:lstStyle/>
+          <a:p>
+            <a:r>
+              <a:rPr lang="en-GB" dirty="0"/>
+              <a:t>Use same blob detection</a:t>
+            </a:r>
+          </a:p>
+          <a:p>
+            <a:r>
+              <a:rPr lang="en-GB" dirty="0"/>
+              <a:t>Add up all blobs</a:t>
+            </a:r>
+          </a:p>
+          <a:p>
+            <a:r>
+              <a:rPr lang="en-GB" dirty="0"/>
+              <a:t>Then use CNN for classification</a:t>
+            </a:r>
+          </a:p>
+        </p:txBody>
+      </p:sp>
+      <p:sp>
+        <p:nvSpPr>
           <p:cNvPr id="3" name="Foliennummernplatzhalter 2">
             <a:extLst>
               <a:ext uri="{FF2B5EF4-FFF2-40B4-BE49-F238E27FC236}">
-                <a16:creationId xmlns:a16="http://schemas.microsoft.com/office/drawing/2014/main" id="{A0AD3461-D246-4240-B04A-3B49916BE50E}"/>
+                <a16:creationId xmlns:a16="http://schemas.microsoft.com/office/drawing/2014/main" id="{45FDC699-C2A0-4921-BD9D-330BF42AFE41}"/>
               </a:ext>
             </a:extLst>
           </p:cNvPr>
@@ -4859,7 +6270,7 @@
           <p:cNvPr id="4" name="Titel 3">
             <a:extLst>
               <a:ext uri="{FF2B5EF4-FFF2-40B4-BE49-F238E27FC236}">
-                <a16:creationId xmlns:a16="http://schemas.microsoft.com/office/drawing/2014/main" id="{9F31D83D-1764-4D98-8916-75B26B305D1C}"/>
+                <a16:creationId xmlns:a16="http://schemas.microsoft.com/office/drawing/2014/main" id="{60B01397-2CC6-4F47-ABD1-3984BD598D97}"/>
               </a:ext>
             </a:extLst>
           </p:cNvPr>
@@ -4873,7 +6284,7 @@
         <p:spPr>
           <a:xfrm>
             <a:off x="251520" y="171451"/>
-            <a:ext cx="9145016" cy="820625"/>
+            <a:ext cx="8928992" cy="820625"/>
           </a:xfrm>
         </p:spPr>
         <p:txBody>
@@ -4884,157 +6295,14 @@
               <a:rPr lang="en-GB" dirty="0"/>
               <a:t>Step 3 - Gesture recognition – First Approach</a:t>
             </a:r>
-          </a:p>
-        </p:txBody>
-      </p:sp>
-      <p:pic>
-        <p:nvPicPr>
-          <p:cNvPr id="6" name="Grafik 5">
-            <a:extLst>
-              <a:ext uri="{FF2B5EF4-FFF2-40B4-BE49-F238E27FC236}">
-                <a16:creationId xmlns:a16="http://schemas.microsoft.com/office/drawing/2014/main" id="{142D84E6-734B-427D-8E62-F9677FF9BE42}"/>
-              </a:ext>
-            </a:extLst>
-          </p:cNvPr>
-          <p:cNvPicPr>
-            <a:picLocks noChangeAspect="1"/>
-          </p:cNvPicPr>
-          <p:nvPr/>
-        </p:nvPicPr>
-        <p:blipFill>
-          <a:blip r:embed="rId2">
-            <a:extLst>
-              <a:ext uri="{28A0092B-C50C-407E-A947-70E740481C1C}">
-                <a14:useLocalDpi xmlns:a14="http://schemas.microsoft.com/office/drawing/2010/main" val="0"/>
-              </a:ext>
-            </a:extLst>
-          </a:blip>
-          <a:stretch>
-            <a:fillRect/>
-          </a:stretch>
-        </p:blipFill>
-        <p:spPr>
-          <a:xfrm>
-            <a:off x="6516218" y="1142818"/>
-            <a:ext cx="1900731" cy="3147540"/>
-          </a:xfrm>
-          <a:prstGeom prst="rect">
-            <a:avLst/>
-          </a:prstGeom>
-        </p:spPr>
-      </p:pic>
-      <p:pic>
-        <p:nvPicPr>
-          <p:cNvPr id="8" name="Grafik 7">
-            <a:extLst>
-              <a:ext uri="{FF2B5EF4-FFF2-40B4-BE49-F238E27FC236}">
-                <a16:creationId xmlns:a16="http://schemas.microsoft.com/office/drawing/2014/main" id="{72C5A5FA-97E5-46A2-896E-431BD1D571CB}"/>
-              </a:ext>
-            </a:extLst>
-          </p:cNvPr>
-          <p:cNvPicPr>
-            <a:picLocks noChangeAspect="1"/>
-          </p:cNvPicPr>
-          <p:nvPr/>
-        </p:nvPicPr>
-        <p:blipFill>
-          <a:blip r:embed="rId3">
-            <a:extLst>
-              <a:ext uri="{28A0092B-C50C-407E-A947-70E740481C1C}">
-                <a14:useLocalDpi xmlns:a14="http://schemas.microsoft.com/office/drawing/2010/main" val="0"/>
-              </a:ext>
-            </a:extLst>
-          </a:blip>
-          <a:stretch>
-            <a:fillRect/>
-          </a:stretch>
-        </p:blipFill>
-        <p:spPr>
-          <a:xfrm>
-            <a:off x="287524" y="1142819"/>
-            <a:ext cx="1900731" cy="3147540"/>
-          </a:xfrm>
-          <a:prstGeom prst="rect">
-            <a:avLst/>
-          </a:prstGeom>
-        </p:spPr>
-      </p:pic>
-      <p:pic>
-        <p:nvPicPr>
-          <p:cNvPr id="10" name="Grafik 9">
-            <a:extLst>
-              <a:ext uri="{FF2B5EF4-FFF2-40B4-BE49-F238E27FC236}">
-                <a16:creationId xmlns:a16="http://schemas.microsoft.com/office/drawing/2014/main" id="{754CD845-6716-4671-9749-E22708B0270E}"/>
-              </a:ext>
-            </a:extLst>
-          </p:cNvPr>
-          <p:cNvPicPr>
-            <a:picLocks noChangeAspect="1"/>
-          </p:cNvPicPr>
-          <p:nvPr/>
-        </p:nvPicPr>
-        <p:blipFill>
-          <a:blip r:embed="rId4">
-            <a:extLst>
-              <a:ext uri="{28A0092B-C50C-407E-A947-70E740481C1C}">
-                <a14:useLocalDpi xmlns:a14="http://schemas.microsoft.com/office/drawing/2010/main" val="0"/>
-              </a:ext>
-            </a:extLst>
-          </a:blip>
-          <a:stretch>
-            <a:fillRect/>
-          </a:stretch>
-        </p:blipFill>
-        <p:spPr>
-          <a:xfrm>
-            <a:off x="2339752" y="1142819"/>
-            <a:ext cx="1900731" cy="3147540"/>
-          </a:xfrm>
-          <a:prstGeom prst="rect">
-            <a:avLst/>
-          </a:prstGeom>
-        </p:spPr>
-      </p:pic>
-      <p:pic>
-        <p:nvPicPr>
-          <p:cNvPr id="12" name="Grafik 11">
-            <a:extLst>
-              <a:ext uri="{FF2B5EF4-FFF2-40B4-BE49-F238E27FC236}">
-                <a16:creationId xmlns:a16="http://schemas.microsoft.com/office/drawing/2014/main" id="{CB38C1D1-4CDC-44D1-9D2C-0EF15591C217}"/>
-              </a:ext>
-            </a:extLst>
-          </p:cNvPr>
-          <p:cNvPicPr>
-            <a:picLocks noChangeAspect="1"/>
-          </p:cNvPicPr>
-          <p:nvPr/>
-        </p:nvPicPr>
-        <p:blipFill>
-          <a:blip r:embed="rId5">
-            <a:extLst>
-              <a:ext uri="{28A0092B-C50C-407E-A947-70E740481C1C}">
-                <a14:useLocalDpi xmlns:a14="http://schemas.microsoft.com/office/drawing/2010/main" val="0"/>
-              </a:ext>
-            </a:extLst>
-          </a:blip>
-          <a:stretch>
-            <a:fillRect/>
-          </a:stretch>
-        </p:blipFill>
-        <p:spPr>
-          <a:xfrm>
-            <a:off x="4427985" y="1142819"/>
-            <a:ext cx="1900731" cy="3147540"/>
-          </a:xfrm>
-          <a:prstGeom prst="rect">
-            <a:avLst/>
-          </a:prstGeom>
-        </p:spPr>
-      </p:pic>
+            <a:endParaRPr lang="en-DE" dirty="0"/>
+          </a:p>
+        </p:txBody>
+      </p:sp>
     </p:spTree>
     <p:extLst>
       <p:ext uri="{BB962C8B-B14F-4D97-AF65-F5344CB8AC3E}">
-        <p14:creationId xmlns:p14="http://schemas.microsoft.com/office/powerpoint/2010/main" val="3284188939"/>
+        <p14:creationId xmlns:p14="http://schemas.microsoft.com/office/powerpoint/2010/main" val="2616312968"/>
       </p:ext>
     </p:extLst>
   </p:cSld>
@@ -5061,21 +6329,81 @@
           <a:chExt cx="0" cy="0"/>
         </a:xfrm>
       </p:grpSpPr>
+      <p:sp>
+        <p:nvSpPr>
+          <p:cNvPr id="3" name="Foliennummernplatzhalter 2">
+            <a:extLst>
+              <a:ext uri="{FF2B5EF4-FFF2-40B4-BE49-F238E27FC236}">
+                <a16:creationId xmlns:a16="http://schemas.microsoft.com/office/drawing/2014/main" id="{A0AD3461-D246-4240-B04A-3B49916BE50E}"/>
+              </a:ext>
+            </a:extLst>
+          </p:cNvPr>
+          <p:cNvSpPr>
+            <a:spLocks noGrp="1"/>
+          </p:cNvSpPr>
+          <p:nvPr>
+            <p:ph type="sldNum" sz="quarter" idx="12"/>
+          </p:nvPr>
+        </p:nvSpPr>
+        <p:spPr/>
+        <p:txBody>
+          <a:bodyPr/>
+          <a:lstStyle/>
+          <a:p>
+            <a:fld id="{29AD3987-26BA-49DC-BA24-72731371DC9F}" type="slidenum">
+              <a:rPr lang="de-DE" smtClean="0"/>
+              <a:t>8</a:t>
+            </a:fld>
+            <a:endParaRPr lang="de-DE" dirty="0"/>
+          </a:p>
+        </p:txBody>
+      </p:sp>
+      <p:sp>
+        <p:nvSpPr>
+          <p:cNvPr id="4" name="Titel 3">
+            <a:extLst>
+              <a:ext uri="{FF2B5EF4-FFF2-40B4-BE49-F238E27FC236}">
+                <a16:creationId xmlns:a16="http://schemas.microsoft.com/office/drawing/2014/main" id="{9F31D83D-1764-4D98-8916-75B26B305D1C}"/>
+              </a:ext>
+            </a:extLst>
+          </p:cNvPr>
+          <p:cNvSpPr>
+            <a:spLocks noGrp="1"/>
+          </p:cNvSpPr>
+          <p:nvPr>
+            <p:ph type="title"/>
+          </p:nvPr>
+        </p:nvSpPr>
+        <p:spPr>
+          <a:xfrm>
+            <a:off x="251520" y="171451"/>
+            <a:ext cx="9001000" cy="820625"/>
+          </a:xfrm>
+        </p:spPr>
+        <p:txBody>
+          <a:bodyPr/>
+          <a:lstStyle/>
+          <a:p>
+            <a:r>
+              <a:rPr lang="en-GB" dirty="0"/>
+              <a:t>Step 3- Gesture recognition – First Approach</a:t>
+            </a:r>
+          </a:p>
+        </p:txBody>
+      </p:sp>
       <p:pic>
         <p:nvPicPr>
-          <p:cNvPr id="6" name="Inhaltsplatzhalter 5">
+          <p:cNvPr id="6" name="Grafik 5">
             <a:extLst>
               <a:ext uri="{FF2B5EF4-FFF2-40B4-BE49-F238E27FC236}">
-                <a16:creationId xmlns:a16="http://schemas.microsoft.com/office/drawing/2014/main" id="{201A2C48-CE71-45D1-B651-097D8A492D9D}"/>
+                <a16:creationId xmlns:a16="http://schemas.microsoft.com/office/drawing/2014/main" id="{142D84E6-734B-427D-8E62-F9677FF9BE42}"/>
               </a:ext>
             </a:extLst>
           </p:cNvPr>
           <p:cNvPicPr>
-            <a:picLocks noGrp="1" noChangeAspect="1"/>
+            <a:picLocks noChangeAspect="1"/>
           </p:cNvPicPr>
-          <p:nvPr>
-            <p:ph idx="1"/>
-          </p:nvPr>
+          <p:nvPr/>
         </p:nvPicPr>
         <p:blipFill>
           <a:blip r:embed="rId2">
@@ -5091,73 +6419,126 @@
         </p:blipFill>
         <p:spPr>
           <a:xfrm>
-            <a:off x="1503697" y="1203325"/>
-            <a:ext cx="6136605" cy="3398838"/>
-          </a:xfrm>
+            <a:off x="6516218" y="1142818"/>
+            <a:ext cx="1900731" cy="3147541"/>
+          </a:xfrm>
+          <a:prstGeom prst="rect">
+            <a:avLst/>
+          </a:prstGeom>
         </p:spPr>
       </p:pic>
-      <p:sp>
-        <p:nvSpPr>
-          <p:cNvPr id="3" name="Foliennummernplatzhalter 2">
+      <p:pic>
+        <p:nvPicPr>
+          <p:cNvPr id="8" name="Grafik 7">
             <a:extLst>
               <a:ext uri="{FF2B5EF4-FFF2-40B4-BE49-F238E27FC236}">
-                <a16:creationId xmlns:a16="http://schemas.microsoft.com/office/drawing/2014/main" id="{C9816B91-26FF-408A-B023-1C677B5F3B9B}"/>
+                <a16:creationId xmlns:a16="http://schemas.microsoft.com/office/drawing/2014/main" id="{72C5A5FA-97E5-46A2-896E-431BD1D571CB}"/>
               </a:ext>
             </a:extLst>
           </p:cNvPr>
-          <p:cNvSpPr>
-            <a:spLocks noGrp="1"/>
-          </p:cNvSpPr>
-          <p:nvPr>
-            <p:ph type="sldNum" sz="quarter" idx="12"/>
-          </p:nvPr>
-        </p:nvSpPr>
-        <p:spPr/>
-        <p:txBody>
-          <a:bodyPr/>
-          <a:lstStyle/>
-          <a:p>
-            <a:fld id="{29AD3987-26BA-49DC-BA24-72731371DC9F}" type="slidenum">
-              <a:rPr lang="de-DE" smtClean="0"/>
-              <a:t>8</a:t>
-            </a:fld>
-            <a:endParaRPr lang="de-DE" dirty="0"/>
-          </a:p>
-        </p:txBody>
-      </p:sp>
-      <p:sp>
-        <p:nvSpPr>
-          <p:cNvPr id="4" name="Titel 3">
+          <p:cNvPicPr>
+            <a:picLocks noChangeAspect="1"/>
+          </p:cNvPicPr>
+          <p:nvPr/>
+        </p:nvPicPr>
+        <p:blipFill>
+          <a:blip r:embed="rId3">
+            <a:extLst>
+              <a:ext uri="{28A0092B-C50C-407E-A947-70E740481C1C}">
+                <a14:useLocalDpi xmlns:a14="http://schemas.microsoft.com/office/drawing/2010/main" val="0"/>
+              </a:ext>
+            </a:extLst>
+          </a:blip>
+          <a:stretch>
+            <a:fillRect/>
+          </a:stretch>
+        </p:blipFill>
+        <p:spPr>
+          <a:xfrm>
+            <a:off x="287524" y="1142818"/>
+            <a:ext cx="1900731" cy="3147542"/>
+          </a:xfrm>
+          <a:prstGeom prst="rect">
+            <a:avLst/>
+          </a:prstGeom>
+        </p:spPr>
+      </p:pic>
+      <p:pic>
+        <p:nvPicPr>
+          <p:cNvPr id="10" name="Grafik 9">
             <a:extLst>
               <a:ext uri="{FF2B5EF4-FFF2-40B4-BE49-F238E27FC236}">
-                <a16:creationId xmlns:a16="http://schemas.microsoft.com/office/drawing/2014/main" id="{5F546285-1A94-4CC7-A95D-E284F5184377}"/>
+                <a16:creationId xmlns:a16="http://schemas.microsoft.com/office/drawing/2014/main" id="{754CD845-6716-4671-9749-E22708B0270E}"/>
               </a:ext>
             </a:extLst>
           </p:cNvPr>
-          <p:cNvSpPr>
-            <a:spLocks noGrp="1"/>
-          </p:cNvSpPr>
-          <p:nvPr>
-            <p:ph type="title"/>
-          </p:nvPr>
-        </p:nvSpPr>
-        <p:spPr/>
-        <p:txBody>
-          <a:bodyPr/>
-          <a:lstStyle/>
-          <a:p>
-            <a:r>
-              <a:rPr lang="en-GB" dirty="0"/>
-              <a:t>Step 3 - Gesture Recognition - CNN</a:t>
-            </a:r>
-            <a:endParaRPr lang="en-DE" dirty="0"/>
-          </a:p>
-        </p:txBody>
-      </p:sp>
+          <p:cNvPicPr>
+            <a:picLocks noChangeAspect="1"/>
+          </p:cNvPicPr>
+          <p:nvPr/>
+        </p:nvPicPr>
+        <p:blipFill>
+          <a:blip r:embed="rId4">
+            <a:extLst>
+              <a:ext uri="{28A0092B-C50C-407E-A947-70E740481C1C}">
+                <a14:useLocalDpi xmlns:a14="http://schemas.microsoft.com/office/drawing/2010/main" val="0"/>
+              </a:ext>
+            </a:extLst>
+          </a:blip>
+          <a:stretch>
+            <a:fillRect/>
+          </a:stretch>
+        </p:blipFill>
+        <p:spPr>
+          <a:xfrm>
+            <a:off x="2339752" y="1142818"/>
+            <a:ext cx="1900731" cy="3147542"/>
+          </a:xfrm>
+          <a:prstGeom prst="rect">
+            <a:avLst/>
+          </a:prstGeom>
+        </p:spPr>
+      </p:pic>
+      <p:pic>
+        <p:nvPicPr>
+          <p:cNvPr id="12" name="Grafik 11">
+            <a:extLst>
+              <a:ext uri="{FF2B5EF4-FFF2-40B4-BE49-F238E27FC236}">
+                <a16:creationId xmlns:a16="http://schemas.microsoft.com/office/drawing/2014/main" id="{CB38C1D1-4CDC-44D1-9D2C-0EF15591C217}"/>
+              </a:ext>
+            </a:extLst>
+          </p:cNvPr>
+          <p:cNvPicPr>
+            <a:picLocks noChangeAspect="1"/>
+          </p:cNvPicPr>
+          <p:nvPr/>
+        </p:nvPicPr>
+        <p:blipFill>
+          <a:blip r:embed="rId5">
+            <a:extLst>
+              <a:ext uri="{28A0092B-C50C-407E-A947-70E740481C1C}">
+                <a14:useLocalDpi xmlns:a14="http://schemas.microsoft.com/office/drawing/2010/main" val="0"/>
+              </a:ext>
+            </a:extLst>
+          </a:blip>
+          <a:stretch>
+            <a:fillRect/>
+          </a:stretch>
+        </p:blipFill>
+        <p:spPr>
+          <a:xfrm>
+            <a:off x="4427985" y="1142819"/>
+            <a:ext cx="1900731" cy="3147541"/>
+          </a:xfrm>
+          <a:prstGeom prst="rect">
+            <a:avLst/>
+          </a:prstGeom>
+        </p:spPr>
+      </p:pic>
     </p:spTree>
     <p:extLst>
       <p:ext uri="{BB962C8B-B14F-4D97-AF65-F5344CB8AC3E}">
-        <p14:creationId xmlns:p14="http://schemas.microsoft.com/office/powerpoint/2010/main" val="162208365"/>
+        <p14:creationId xmlns:p14="http://schemas.microsoft.com/office/powerpoint/2010/main" val="3016737685"/>
       </p:ext>
     </p:extLst>
   </p:cSld>
@@ -5184,21 +6565,81 @@
           <a:chExt cx="0" cy="0"/>
         </a:xfrm>
       </p:grpSpPr>
+      <p:sp>
+        <p:nvSpPr>
+          <p:cNvPr id="3" name="Foliennummernplatzhalter 2">
+            <a:extLst>
+              <a:ext uri="{FF2B5EF4-FFF2-40B4-BE49-F238E27FC236}">
+                <a16:creationId xmlns:a16="http://schemas.microsoft.com/office/drawing/2014/main" id="{A0AD3461-D246-4240-B04A-3B49916BE50E}"/>
+              </a:ext>
+            </a:extLst>
+          </p:cNvPr>
+          <p:cNvSpPr>
+            <a:spLocks noGrp="1"/>
+          </p:cNvSpPr>
+          <p:nvPr>
+            <p:ph type="sldNum" sz="quarter" idx="12"/>
+          </p:nvPr>
+        </p:nvSpPr>
+        <p:spPr/>
+        <p:txBody>
+          <a:bodyPr/>
+          <a:lstStyle/>
+          <a:p>
+            <a:fld id="{29AD3987-26BA-49DC-BA24-72731371DC9F}" type="slidenum">
+              <a:rPr lang="de-DE" smtClean="0"/>
+              <a:t>9</a:t>
+            </a:fld>
+            <a:endParaRPr lang="de-DE" dirty="0"/>
+          </a:p>
+        </p:txBody>
+      </p:sp>
+      <p:sp>
+        <p:nvSpPr>
+          <p:cNvPr id="4" name="Titel 3">
+            <a:extLst>
+              <a:ext uri="{FF2B5EF4-FFF2-40B4-BE49-F238E27FC236}">
+                <a16:creationId xmlns:a16="http://schemas.microsoft.com/office/drawing/2014/main" id="{9F31D83D-1764-4D98-8916-75B26B305D1C}"/>
+              </a:ext>
+            </a:extLst>
+          </p:cNvPr>
+          <p:cNvSpPr>
+            <a:spLocks noGrp="1"/>
+          </p:cNvSpPr>
+          <p:nvPr>
+            <p:ph type="title"/>
+          </p:nvPr>
+        </p:nvSpPr>
+        <p:spPr>
+          <a:xfrm>
+            <a:off x="251520" y="171451"/>
+            <a:ext cx="9145016" cy="820625"/>
+          </a:xfrm>
+        </p:spPr>
+        <p:txBody>
+          <a:bodyPr/>
+          <a:lstStyle/>
+          <a:p>
+            <a:r>
+              <a:rPr lang="en-GB" dirty="0"/>
+              <a:t>Step 3 - Gesture recognition – First Approach</a:t>
+            </a:r>
+          </a:p>
+        </p:txBody>
+      </p:sp>
       <p:pic>
         <p:nvPicPr>
-          <p:cNvPr id="6" name="Inhaltsplatzhalter 5">
+          <p:cNvPr id="6" name="Grafik 5">
             <a:extLst>
               <a:ext uri="{FF2B5EF4-FFF2-40B4-BE49-F238E27FC236}">
-                <a16:creationId xmlns:a16="http://schemas.microsoft.com/office/drawing/2014/main" id="{201A2C48-CE71-45D1-B651-097D8A492D9D}"/>
+                <a16:creationId xmlns:a16="http://schemas.microsoft.com/office/drawing/2014/main" id="{142D84E6-734B-427D-8E62-F9677FF9BE42}"/>
               </a:ext>
             </a:extLst>
           </p:cNvPr>
           <p:cNvPicPr>
-            <a:picLocks noGrp="1" noChangeAspect="1"/>
+            <a:picLocks noChangeAspect="1"/>
           </p:cNvPicPr>
-          <p:nvPr>
-            <p:ph idx="1"/>
-          </p:nvPr>
+          <p:nvPr/>
         </p:nvPicPr>
         <p:blipFill>
           <a:blip r:embed="rId2">
@@ -5214,73 +6655,126 @@
         </p:blipFill>
         <p:spPr>
           <a:xfrm>
-            <a:off x="1503697" y="1203325"/>
-            <a:ext cx="6136605" cy="3398837"/>
-          </a:xfrm>
+            <a:off x="6516218" y="1142818"/>
+            <a:ext cx="1900731" cy="3147540"/>
+          </a:xfrm>
+          <a:prstGeom prst="rect">
+            <a:avLst/>
+          </a:prstGeom>
         </p:spPr>
       </p:pic>
-      <p:sp>
-        <p:nvSpPr>
-          <p:cNvPr id="3" name="Foliennummernplatzhalter 2">
+      <p:pic>
+        <p:nvPicPr>
+          <p:cNvPr id="8" name="Grafik 7">
             <a:extLst>
               <a:ext uri="{FF2B5EF4-FFF2-40B4-BE49-F238E27FC236}">
-                <a16:creationId xmlns:a16="http://schemas.microsoft.com/office/drawing/2014/main" id="{C9816B91-26FF-408A-B023-1C677B5F3B9B}"/>
+                <a16:creationId xmlns:a16="http://schemas.microsoft.com/office/drawing/2014/main" id="{72C5A5FA-97E5-46A2-896E-431BD1D571CB}"/>
               </a:ext>
             </a:extLst>
           </p:cNvPr>
-          <p:cNvSpPr>
-            <a:spLocks noGrp="1"/>
-          </p:cNvSpPr>
-          <p:nvPr>
-            <p:ph type="sldNum" sz="quarter" idx="12"/>
-          </p:nvPr>
-        </p:nvSpPr>
-        <p:spPr/>
-        <p:txBody>
-          <a:bodyPr/>
-          <a:lstStyle/>
-          <a:p>
-            <a:fld id="{29AD3987-26BA-49DC-BA24-72731371DC9F}" type="slidenum">
-              <a:rPr lang="de-DE" smtClean="0"/>
-              <a:t>9</a:t>
-            </a:fld>
-            <a:endParaRPr lang="de-DE" dirty="0"/>
-          </a:p>
-        </p:txBody>
-      </p:sp>
-      <p:sp>
-        <p:nvSpPr>
-          <p:cNvPr id="4" name="Titel 3">
+          <p:cNvPicPr>
+            <a:picLocks noChangeAspect="1"/>
+          </p:cNvPicPr>
+          <p:nvPr/>
+        </p:nvPicPr>
+        <p:blipFill>
+          <a:blip r:embed="rId3">
+            <a:extLst>
+              <a:ext uri="{28A0092B-C50C-407E-A947-70E740481C1C}">
+                <a14:useLocalDpi xmlns:a14="http://schemas.microsoft.com/office/drawing/2010/main" val="0"/>
+              </a:ext>
+            </a:extLst>
+          </a:blip>
+          <a:stretch>
+            <a:fillRect/>
+          </a:stretch>
+        </p:blipFill>
+        <p:spPr>
+          <a:xfrm>
+            <a:off x="287524" y="1142819"/>
+            <a:ext cx="1900731" cy="3147540"/>
+          </a:xfrm>
+          <a:prstGeom prst="rect">
+            <a:avLst/>
+          </a:prstGeom>
+        </p:spPr>
+      </p:pic>
+      <p:pic>
+        <p:nvPicPr>
+          <p:cNvPr id="10" name="Grafik 9">
             <a:extLst>
               <a:ext uri="{FF2B5EF4-FFF2-40B4-BE49-F238E27FC236}">
-                <a16:creationId xmlns:a16="http://schemas.microsoft.com/office/drawing/2014/main" id="{5F546285-1A94-4CC7-A95D-E284F5184377}"/>
+                <a16:creationId xmlns:a16="http://schemas.microsoft.com/office/drawing/2014/main" id="{754CD845-6716-4671-9749-E22708B0270E}"/>
               </a:ext>
             </a:extLst>
           </p:cNvPr>
-          <p:cNvSpPr>
-            <a:spLocks noGrp="1"/>
-          </p:cNvSpPr>
-          <p:nvPr>
-            <p:ph type="title"/>
-          </p:nvPr>
-        </p:nvSpPr>
-        <p:spPr/>
-        <p:txBody>
-          <a:bodyPr/>
-          <a:lstStyle/>
-          <a:p>
-            <a:r>
-              <a:rPr lang="en-GB" dirty="0"/>
-              <a:t>Step 3 - Gesture Recognition - CNN</a:t>
-            </a:r>
-            <a:endParaRPr lang="en-DE" dirty="0"/>
-          </a:p>
-        </p:txBody>
-      </p:sp>
+          <p:cNvPicPr>
+            <a:picLocks noChangeAspect="1"/>
+          </p:cNvPicPr>
+          <p:nvPr/>
+        </p:nvPicPr>
+        <p:blipFill>
+          <a:blip r:embed="rId4">
+            <a:extLst>
+              <a:ext uri="{28A0092B-C50C-407E-A947-70E740481C1C}">
+                <a14:useLocalDpi xmlns:a14="http://schemas.microsoft.com/office/drawing/2010/main" val="0"/>
+              </a:ext>
+            </a:extLst>
+          </a:blip>
+          <a:stretch>
+            <a:fillRect/>
+          </a:stretch>
+        </p:blipFill>
+        <p:spPr>
+          <a:xfrm>
+            <a:off x="2339752" y="1142819"/>
+            <a:ext cx="1900731" cy="3147540"/>
+          </a:xfrm>
+          <a:prstGeom prst="rect">
+            <a:avLst/>
+          </a:prstGeom>
+        </p:spPr>
+      </p:pic>
+      <p:pic>
+        <p:nvPicPr>
+          <p:cNvPr id="12" name="Grafik 11">
+            <a:extLst>
+              <a:ext uri="{FF2B5EF4-FFF2-40B4-BE49-F238E27FC236}">
+                <a16:creationId xmlns:a16="http://schemas.microsoft.com/office/drawing/2014/main" id="{CB38C1D1-4CDC-44D1-9D2C-0EF15591C217}"/>
+              </a:ext>
+            </a:extLst>
+          </p:cNvPr>
+          <p:cNvPicPr>
+            <a:picLocks noChangeAspect="1"/>
+          </p:cNvPicPr>
+          <p:nvPr/>
+        </p:nvPicPr>
+        <p:blipFill>
+          <a:blip r:embed="rId5">
+            <a:extLst>
+              <a:ext uri="{28A0092B-C50C-407E-A947-70E740481C1C}">
+                <a14:useLocalDpi xmlns:a14="http://schemas.microsoft.com/office/drawing/2010/main" val="0"/>
+              </a:ext>
+            </a:extLst>
+          </a:blip>
+          <a:stretch>
+            <a:fillRect/>
+          </a:stretch>
+        </p:blipFill>
+        <p:spPr>
+          <a:xfrm>
+            <a:off x="4427985" y="1142819"/>
+            <a:ext cx="1900731" cy="3147540"/>
+          </a:xfrm>
+          <a:prstGeom prst="rect">
+            <a:avLst/>
+          </a:prstGeom>
+        </p:spPr>
+      </p:pic>
     </p:spTree>
     <p:extLst>
       <p:ext uri="{BB962C8B-B14F-4D97-AF65-F5344CB8AC3E}">
-        <p14:creationId xmlns:p14="http://schemas.microsoft.com/office/powerpoint/2010/main" val="2954922334"/>
+        <p14:creationId xmlns:p14="http://schemas.microsoft.com/office/powerpoint/2010/main" val="3284188939"/>
       </p:ext>
     </p:extLst>
   </p:cSld>

</xml_diff>

<commit_message>
New model in step2 intermpres
</commit_message>
<xml_diff>
--- a/Presentations/InterimPresentation.pptx
+++ b/Presentations/InterimPresentation.pptx
@@ -5,7 +5,7 @@
     <p:sldMasterId id="2147483648" r:id="rId1"/>
   </p:sldMasterIdLst>
   <p:notesMasterIdLst>
-    <p:notesMasterId r:id="rId14"/>
+    <p:notesMasterId r:id="rId13"/>
   </p:notesMasterIdLst>
   <p:sldIdLst>
     <p:sldId id="259" r:id="rId2"/>
@@ -13,13 +13,12 @@
     <p:sldId id="271" r:id="rId4"/>
     <p:sldId id="272" r:id="rId5"/>
     <p:sldId id="275" r:id="rId6"/>
-    <p:sldId id="276" r:id="rId7"/>
-    <p:sldId id="268" r:id="rId8"/>
-    <p:sldId id="266" r:id="rId9"/>
-    <p:sldId id="267" r:id="rId10"/>
-    <p:sldId id="273" r:id="rId11"/>
-    <p:sldId id="274" r:id="rId12"/>
-    <p:sldId id="270" r:id="rId13"/>
+    <p:sldId id="268" r:id="rId7"/>
+    <p:sldId id="266" r:id="rId8"/>
+    <p:sldId id="267" r:id="rId9"/>
+    <p:sldId id="273" r:id="rId10"/>
+    <p:sldId id="274" r:id="rId11"/>
+    <p:sldId id="270" r:id="rId12"/>
   </p:sldIdLst>
   <p:sldSz cx="9144000" cy="5143500" type="screen16x9"/>
   <p:notesSz cx="6858000" cy="9144000"/>
@@ -769,7 +768,7 @@
           <a:p>
             <a:fld id="{6F4F2A7C-E896-4C15-99D8-2B5BC94A4F36}" type="slidenum">
               <a:rPr lang="de-DE" smtClean="0"/>
-              <a:t>12</a:t>
+              <a:t>11</a:t>
             </a:fld>
             <a:endParaRPr lang="de-DE"/>
           </a:p>
@@ -2989,7 +2988,7 @@
         <p:spPr>
           <a:xfrm>
             <a:off x="1503697" y="1203325"/>
-            <a:ext cx="6136605" cy="3398838"/>
+            <a:ext cx="6136605" cy="3398837"/>
           </a:xfrm>
         </p:spPr>
       </p:pic>
@@ -3054,7 +3053,7 @@
     </p:spTree>
     <p:extLst>
       <p:ext uri="{BB962C8B-B14F-4D97-AF65-F5344CB8AC3E}">
-        <p14:creationId xmlns:p14="http://schemas.microsoft.com/office/powerpoint/2010/main" val="162208365"/>
+        <p14:creationId xmlns:p14="http://schemas.microsoft.com/office/powerpoint/2010/main" val="2954922334"/>
       </p:ext>
     </p:extLst>
   </p:cSld>
@@ -3081,47 +3080,12 @@
           <a:chExt cx="0" cy="0"/>
         </a:xfrm>
       </p:grpSpPr>
-      <p:pic>
-        <p:nvPicPr>
-          <p:cNvPr id="6" name="Inhaltsplatzhalter 5">
+      <p:sp>
+        <p:nvSpPr>
+          <p:cNvPr id="2" name="Inhaltsplatzhalter 1">
             <a:extLst>
               <a:ext uri="{FF2B5EF4-FFF2-40B4-BE49-F238E27FC236}">
-                <a16:creationId xmlns:a16="http://schemas.microsoft.com/office/drawing/2014/main" id="{201A2C48-CE71-45D1-B651-097D8A492D9D}"/>
-              </a:ext>
-            </a:extLst>
-          </p:cNvPr>
-          <p:cNvPicPr>
-            <a:picLocks noGrp="1" noChangeAspect="1"/>
-          </p:cNvPicPr>
-          <p:nvPr>
-            <p:ph idx="1"/>
-          </p:nvPr>
-        </p:nvPicPr>
-        <p:blipFill>
-          <a:blip r:embed="rId2">
-            <a:extLst>
-              <a:ext uri="{28A0092B-C50C-407E-A947-70E740481C1C}">
-                <a14:useLocalDpi xmlns:a14="http://schemas.microsoft.com/office/drawing/2010/main" val="0"/>
-              </a:ext>
-            </a:extLst>
-          </a:blip>
-          <a:stretch>
-            <a:fillRect/>
-          </a:stretch>
-        </p:blipFill>
-        <p:spPr>
-          <a:xfrm>
-            <a:off x="1503697" y="1203325"/>
-            <a:ext cx="6136605" cy="3398837"/>
-          </a:xfrm>
-        </p:spPr>
-      </p:pic>
-      <p:sp>
-        <p:nvSpPr>
-          <p:cNvPr id="3" name="Foliennummernplatzhalter 2">
-            <a:extLst>
-              <a:ext uri="{FF2B5EF4-FFF2-40B4-BE49-F238E27FC236}">
-                <a16:creationId xmlns:a16="http://schemas.microsoft.com/office/drawing/2014/main" id="{C9816B91-26FF-408A-B023-1C677B5F3B9B}"/>
+                <a16:creationId xmlns:a16="http://schemas.microsoft.com/office/drawing/2014/main" id="{7E63AEB2-2FE4-4010-8A85-386F6D3D7A7B}"/>
               </a:ext>
             </a:extLst>
           </p:cNvPr>
@@ -3129,7 +3093,7 @@
             <a:spLocks noGrp="1"/>
           </p:cNvSpPr>
           <p:nvPr>
-            <p:ph type="sldNum" sz="quarter" idx="12"/>
+            <p:ph idx="1"/>
           </p:nvPr>
         </p:nvSpPr>
         <p:spPr/>
@@ -3137,20 +3101,37 @@
           <a:bodyPr/>
           <a:lstStyle/>
           <a:p>
-            <a:fld id="{29AD3987-26BA-49DC-BA24-72731371DC9F}" type="slidenum">
-              <a:rPr lang="de-DE" smtClean="0"/>
-              <a:t>11</a:t>
-            </a:fld>
-            <a:endParaRPr lang="de-DE" dirty="0"/>
-          </a:p>
-        </p:txBody>
-      </p:sp>
-      <p:sp>
-        <p:nvSpPr>
-          <p:cNvPr id="4" name="Titel 3">
+            <a:r>
+              <a:rPr lang="en-GB" dirty="0"/>
+              <a:t>LSTM to the rescue</a:t>
+            </a:r>
+          </a:p>
+          <a:p>
+            <a:r>
+              <a:rPr lang="en-GB" dirty="0"/>
+              <a:t>Hopefully better test results</a:t>
+            </a:r>
+          </a:p>
+          <a:p>
+            <a:r>
+              <a:rPr lang="en-GB" dirty="0"/>
+              <a:t>Hopefully less overfitting</a:t>
+            </a:r>
+          </a:p>
+          <a:p>
+            <a:r>
+              <a:rPr lang="en-GB" dirty="0"/>
+              <a:t>Currently work in progress</a:t>
+            </a:r>
+          </a:p>
+        </p:txBody>
+      </p:sp>
+      <p:sp>
+        <p:nvSpPr>
+          <p:cNvPr id="3" name="Foliennummernplatzhalter 2">
             <a:extLst>
               <a:ext uri="{FF2B5EF4-FFF2-40B4-BE49-F238E27FC236}">
-                <a16:creationId xmlns:a16="http://schemas.microsoft.com/office/drawing/2014/main" id="{5F546285-1A94-4CC7-A95D-E284F5184377}"/>
+                <a16:creationId xmlns:a16="http://schemas.microsoft.com/office/drawing/2014/main" id="{690352B3-46CA-4F94-A201-BAEDA585035B}"/>
               </a:ext>
             </a:extLst>
           </p:cNvPr>
@@ -3158,7 +3139,7 @@
             <a:spLocks noGrp="1"/>
           </p:cNvSpPr>
           <p:nvPr>
-            <p:ph type="title"/>
+            <p:ph type="sldNum" sz="quarter" idx="12"/>
           </p:nvPr>
         </p:nvSpPr>
         <p:spPr/>
@@ -3166,114 +3147,9 @@
           <a:bodyPr/>
           <a:lstStyle/>
           <a:p>
-            <a:r>
-              <a:rPr lang="en-GB" dirty="0"/>
-              <a:t>Step 3 - Gesture Recognition - CNN</a:t>
-            </a:r>
-            <a:endParaRPr lang="en-DE" dirty="0"/>
-          </a:p>
-        </p:txBody>
-      </p:sp>
-    </p:spTree>
-    <p:extLst>
-      <p:ext uri="{BB962C8B-B14F-4D97-AF65-F5344CB8AC3E}">
-        <p14:creationId xmlns:p14="http://schemas.microsoft.com/office/powerpoint/2010/main" val="2954922334"/>
-      </p:ext>
-    </p:extLst>
-  </p:cSld>
-  <p:clrMapOvr>
-    <a:masterClrMapping/>
-  </p:clrMapOvr>
-</p:sld>
-</file>
-
-<file path=ppt/slides/slide12.xml><?xml version="1.0" encoding="utf-8"?>
-<p:sld xmlns:a="http://schemas.openxmlformats.org/drawingml/2006/main" xmlns:r="http://schemas.openxmlformats.org/officeDocument/2006/relationships" xmlns:p="http://schemas.openxmlformats.org/presentationml/2006/main">
-  <p:cSld>
-    <p:spTree>
-      <p:nvGrpSpPr>
-        <p:cNvPr id="1" name=""/>
-        <p:cNvGrpSpPr/>
-        <p:nvPr/>
-      </p:nvGrpSpPr>
-      <p:grpSpPr>
-        <a:xfrm>
-          <a:off x="0" y="0"/>
-          <a:ext cx="0" cy="0"/>
-          <a:chOff x="0" y="0"/>
-          <a:chExt cx="0" cy="0"/>
-        </a:xfrm>
-      </p:grpSpPr>
-      <p:sp>
-        <p:nvSpPr>
-          <p:cNvPr id="2" name="Inhaltsplatzhalter 1">
-            <a:extLst>
-              <a:ext uri="{FF2B5EF4-FFF2-40B4-BE49-F238E27FC236}">
-                <a16:creationId xmlns:a16="http://schemas.microsoft.com/office/drawing/2014/main" id="{7E63AEB2-2FE4-4010-8A85-386F6D3D7A7B}"/>
-              </a:ext>
-            </a:extLst>
-          </p:cNvPr>
-          <p:cNvSpPr>
-            <a:spLocks noGrp="1"/>
-          </p:cNvSpPr>
-          <p:nvPr>
-            <p:ph idx="1"/>
-          </p:nvPr>
-        </p:nvSpPr>
-        <p:spPr/>
-        <p:txBody>
-          <a:bodyPr/>
-          <a:lstStyle/>
-          <a:p>
-            <a:r>
-              <a:rPr lang="en-GB" dirty="0"/>
-              <a:t>LSTM to the rescue</a:t>
-            </a:r>
-          </a:p>
-          <a:p>
-            <a:r>
-              <a:rPr lang="en-GB" dirty="0"/>
-              <a:t>Hopefully better test results</a:t>
-            </a:r>
-          </a:p>
-          <a:p>
-            <a:r>
-              <a:rPr lang="en-GB" dirty="0"/>
-              <a:t>Hopefully less overfitting</a:t>
-            </a:r>
-          </a:p>
-          <a:p>
-            <a:r>
-              <a:rPr lang="en-GB" dirty="0"/>
-              <a:t>Currently work in progress</a:t>
-            </a:r>
-          </a:p>
-        </p:txBody>
-      </p:sp>
-      <p:sp>
-        <p:nvSpPr>
-          <p:cNvPr id="3" name="Foliennummernplatzhalter 2">
-            <a:extLst>
-              <a:ext uri="{FF2B5EF4-FFF2-40B4-BE49-F238E27FC236}">
-                <a16:creationId xmlns:a16="http://schemas.microsoft.com/office/drawing/2014/main" id="{690352B3-46CA-4F94-A201-BAEDA585035B}"/>
-              </a:ext>
-            </a:extLst>
-          </p:cNvPr>
-          <p:cNvSpPr>
-            <a:spLocks noGrp="1"/>
-          </p:cNvSpPr>
-          <p:nvPr>
-            <p:ph type="sldNum" sz="quarter" idx="12"/>
-          </p:nvPr>
-        </p:nvSpPr>
-        <p:spPr/>
-        <p:txBody>
-          <a:bodyPr/>
-          <a:lstStyle/>
-          <a:p>
             <a:fld id="{29AD3987-26BA-49DC-BA24-72731371DC9F}" type="slidenum">
               <a:rPr lang="de-DE" smtClean="0"/>
-              <a:t>12</a:t>
+              <a:t>11</a:t>
             </a:fld>
             <a:endParaRPr lang="de-DE" dirty="0"/>
           </a:p>
@@ -5525,41 +5401,6 @@
           <a:chExt cx="0" cy="0"/>
         </a:xfrm>
       </p:grpSpPr>
-      <p:pic>
-        <p:nvPicPr>
-          <p:cNvPr id="7" name="Grafik 6">
-            <a:extLst>
-              <a:ext uri="{FF2B5EF4-FFF2-40B4-BE49-F238E27FC236}">
-                <a16:creationId xmlns:a16="http://schemas.microsoft.com/office/drawing/2014/main" id="{11E21259-6578-47E9-BB3B-C14AF04A3113}"/>
-              </a:ext>
-            </a:extLst>
-          </p:cNvPr>
-          <p:cNvPicPr>
-            <a:picLocks noChangeAspect="1"/>
-          </p:cNvPicPr>
-          <p:nvPr/>
-        </p:nvPicPr>
-        <p:blipFill rotWithShape="1">
-          <a:blip r:embed="rId2">
-            <a:extLst>
-              <a:ext uri="{28A0092B-C50C-407E-A947-70E740481C1C}">
-                <a14:useLocalDpi xmlns:a14="http://schemas.microsoft.com/office/drawing/2010/main" val="0"/>
-              </a:ext>
-            </a:extLst>
-          </a:blip>
-          <a:srcRect l="5741" t="7573" r="8147" b="6314"/>
-          <a:stretch/>
-        </p:blipFill>
-        <p:spPr>
-          <a:xfrm>
-            <a:off x="1475656" y="843558"/>
-            <a:ext cx="5832648" cy="3888432"/>
-          </a:xfrm>
-          <a:prstGeom prst="rect">
-            <a:avLst/>
-          </a:prstGeom>
-        </p:spPr>
-      </p:pic>
       <p:sp>
         <p:nvSpPr>
           <p:cNvPr id="3" name="Foliennummernplatzhalter 2">
@@ -5633,13 +5474,13 @@
           <p:nvPr/>
         </p:nvPicPr>
         <p:blipFill>
-          <a:blip r:embed="rId3">
+          <a:blip r:embed="rId2">
             <a:extLst>
               <a:ext uri="{28A0092B-C50C-407E-A947-70E740481C1C}">
                 <a14:useLocalDpi xmlns:a14="http://schemas.microsoft.com/office/drawing/2010/main" val="0"/>
               </a:ext>
               <a:ext uri="{96DAC541-7B7A-43D3-8B79-37D633B846F1}">
-                <asvg:svgBlip xmlns:asvg="http://schemas.microsoft.com/office/drawing/2016/SVG/main" r:embed="rId4"/>
+                <asvg:svgBlip xmlns:asvg="http://schemas.microsoft.com/office/drawing/2016/SVG/main" r:embed="rId3"/>
               </a:ext>
             </a:extLst>
           </a:blip>
@@ -5651,6 +5492,41 @@
           <a:xfrm>
             <a:off x="7499176" y="171451"/>
             <a:ext cx="817240" cy="817240"/>
+          </a:xfrm>
+          <a:prstGeom prst="rect">
+            <a:avLst/>
+          </a:prstGeom>
+        </p:spPr>
+      </p:pic>
+      <p:pic>
+        <p:nvPicPr>
+          <p:cNvPr id="8" name="Grafik 7">
+            <a:extLst>
+              <a:ext uri="{FF2B5EF4-FFF2-40B4-BE49-F238E27FC236}">
+                <a16:creationId xmlns:a16="http://schemas.microsoft.com/office/drawing/2014/main" id="{3CF04DFA-9C37-4CFF-BC8E-943056758AE8}"/>
+              </a:ext>
+            </a:extLst>
+          </p:cNvPr>
+          <p:cNvPicPr>
+            <a:picLocks noChangeAspect="1"/>
+          </p:cNvPicPr>
+          <p:nvPr/>
+        </p:nvPicPr>
+        <p:blipFill rotWithShape="1">
+          <a:blip r:embed="rId4">
+            <a:extLst>
+              <a:ext uri="{28A0092B-C50C-407E-A947-70E740481C1C}">
+                <a14:useLocalDpi xmlns:a14="http://schemas.microsoft.com/office/drawing/2010/main" val="0"/>
+              </a:ext>
+            </a:extLst>
+          </a:blip>
+          <a:srcRect l="4063" t="11118" r="7999" b="4719"/>
+          <a:stretch/>
+        </p:blipFill>
+        <p:spPr>
+          <a:xfrm>
+            <a:off x="1403648" y="915566"/>
+            <a:ext cx="5910786" cy="3771409"/>
           </a:xfrm>
           <a:prstGeom prst="rect">
             <a:avLst/>
@@ -5689,10 +5565,50 @@
       </p:grpSpPr>
       <p:sp>
         <p:nvSpPr>
+          <p:cNvPr id="2" name="Inhaltsplatzhalter 1">
+            <a:extLst>
+              <a:ext uri="{FF2B5EF4-FFF2-40B4-BE49-F238E27FC236}">
+                <a16:creationId xmlns:a16="http://schemas.microsoft.com/office/drawing/2014/main" id="{BBDEB313-80BE-42A6-876F-E892E7589C83}"/>
+              </a:ext>
+            </a:extLst>
+          </p:cNvPr>
+          <p:cNvSpPr>
+            <a:spLocks noGrp="1"/>
+          </p:cNvSpPr>
+          <p:nvPr>
+            <p:ph idx="1"/>
+          </p:nvPr>
+        </p:nvSpPr>
+        <p:spPr/>
+        <p:txBody>
+          <a:bodyPr/>
+          <a:lstStyle/>
+          <a:p>
+            <a:r>
+              <a:rPr lang="en-GB" dirty="0"/>
+              <a:t>Use same blob detection</a:t>
+            </a:r>
+          </a:p>
+          <a:p>
+            <a:r>
+              <a:rPr lang="en-GB" dirty="0"/>
+              <a:t>Add up all blobs</a:t>
+            </a:r>
+          </a:p>
+          <a:p>
+            <a:r>
+              <a:rPr lang="en-GB" dirty="0"/>
+              <a:t>Then use CNN for classification</a:t>
+            </a:r>
+          </a:p>
+        </p:txBody>
+      </p:sp>
+      <p:sp>
+        <p:nvSpPr>
           <p:cNvPr id="3" name="Foliennummernplatzhalter 2">
             <a:extLst>
               <a:ext uri="{FF2B5EF4-FFF2-40B4-BE49-F238E27FC236}">
-                <a16:creationId xmlns:a16="http://schemas.microsoft.com/office/drawing/2014/main" id="{C75CBF3F-4A85-4DB6-A8C3-35B699CD3955}"/>
+                <a16:creationId xmlns:a16="http://schemas.microsoft.com/office/drawing/2014/main" id="{45FDC699-C2A0-4921-BD9D-330BF42AFE41}"/>
               </a:ext>
             </a:extLst>
           </p:cNvPr>
@@ -5721,7 +5637,7 @@
           <p:cNvPr id="4" name="Titel 3">
             <a:extLst>
               <a:ext uri="{FF2B5EF4-FFF2-40B4-BE49-F238E27FC236}">
-                <a16:creationId xmlns:a16="http://schemas.microsoft.com/office/drawing/2014/main" id="{D492C1AC-304C-4F16-B71D-6EBD578D2C00}"/>
+                <a16:creationId xmlns:a16="http://schemas.microsoft.com/office/drawing/2014/main" id="{60B01397-2CC6-4F47-ABD1-3984BD598D97}"/>
               </a:ext>
             </a:extLst>
           </p:cNvPr>
@@ -5732,92 +5648,28 @@
             <p:ph type="title"/>
           </p:nvPr>
         </p:nvSpPr>
-        <p:spPr/>
+        <p:spPr>
+          <a:xfrm>
+            <a:off x="251520" y="171451"/>
+            <a:ext cx="8928992" cy="820625"/>
+          </a:xfrm>
+        </p:spPr>
         <p:txBody>
           <a:bodyPr/>
           <a:lstStyle/>
           <a:p>
             <a:r>
               <a:rPr lang="en-GB" dirty="0"/>
-              <a:t>Step 2 – Finger/Knuckle Recognition</a:t>
-            </a:r>
-            <a:endParaRPr lang="de-DE" dirty="0"/>
-          </a:p>
-        </p:txBody>
-      </p:sp>
-      <p:pic>
-        <p:nvPicPr>
-          <p:cNvPr id="5" name="Grafik 4" descr="Häkchen">
-            <a:extLst>
-              <a:ext uri="{FF2B5EF4-FFF2-40B4-BE49-F238E27FC236}">
-                <a16:creationId xmlns:a16="http://schemas.microsoft.com/office/drawing/2014/main" id="{3D9C5C0E-ED91-4271-AE33-09CBC1CA9162}"/>
-              </a:ext>
-            </a:extLst>
-          </p:cNvPr>
-          <p:cNvPicPr>
-            <a:picLocks noChangeAspect="1"/>
-          </p:cNvPicPr>
-          <p:nvPr/>
-        </p:nvPicPr>
-        <p:blipFill>
-          <a:blip r:embed="rId2">
-            <a:extLst>
-              <a:ext uri="{28A0092B-C50C-407E-A947-70E740481C1C}">
-                <a14:useLocalDpi xmlns:a14="http://schemas.microsoft.com/office/drawing/2010/main" val="0"/>
-              </a:ext>
-              <a:ext uri="{96DAC541-7B7A-43D3-8B79-37D633B846F1}">
-                <asvg:svgBlip xmlns:asvg="http://schemas.microsoft.com/office/drawing/2016/SVG/main" r:embed="rId3"/>
-              </a:ext>
-            </a:extLst>
-          </a:blip>
-          <a:stretch>
-            <a:fillRect/>
-          </a:stretch>
-        </p:blipFill>
-        <p:spPr>
-          <a:xfrm>
-            <a:off x="7499176" y="171451"/>
-            <a:ext cx="817240" cy="817240"/>
-          </a:xfrm>
-          <a:prstGeom prst="rect">
-            <a:avLst/>
-          </a:prstGeom>
-        </p:spPr>
-      </p:pic>
-      <p:pic>
-        <p:nvPicPr>
-          <p:cNvPr id="7" name="Grafik 6">
-            <a:extLst>
-              <a:ext uri="{FF2B5EF4-FFF2-40B4-BE49-F238E27FC236}">
-                <a16:creationId xmlns:a16="http://schemas.microsoft.com/office/drawing/2014/main" id="{3984938C-2EE2-4BA1-BFA8-1E795D27C643}"/>
-              </a:ext>
-            </a:extLst>
-          </p:cNvPr>
-          <p:cNvPicPr>
-            <a:picLocks noChangeAspect="1"/>
-          </p:cNvPicPr>
-          <p:nvPr/>
-        </p:nvPicPr>
-        <p:blipFill>
-          <a:blip r:embed="rId4"/>
-          <a:stretch>
-            <a:fillRect/>
-          </a:stretch>
-        </p:blipFill>
-        <p:spPr>
-          <a:xfrm>
-            <a:off x="1418158" y="1275606"/>
-            <a:ext cx="6119672" cy="2831189"/>
-          </a:xfrm>
-          <a:prstGeom prst="rect">
-            <a:avLst/>
-          </a:prstGeom>
-        </p:spPr>
-      </p:pic>
+              <a:t>Step 3 - Gesture recognition – First Approach</a:t>
+            </a:r>
+            <a:endParaRPr lang="en-DE" dirty="0"/>
+          </a:p>
+        </p:txBody>
+      </p:sp>
     </p:spTree>
     <p:extLst>
       <p:ext uri="{BB962C8B-B14F-4D97-AF65-F5344CB8AC3E}">
-        <p14:creationId xmlns:p14="http://schemas.microsoft.com/office/powerpoint/2010/main" val="4275409732"/>
+        <p14:creationId xmlns:p14="http://schemas.microsoft.com/office/powerpoint/2010/main" val="2616312968"/>
       </p:ext>
     </p:extLst>
   </p:cSld>
@@ -5846,50 +5698,10 @@
       </p:grpSpPr>
       <p:sp>
         <p:nvSpPr>
-          <p:cNvPr id="2" name="Inhaltsplatzhalter 1">
+          <p:cNvPr id="3" name="Foliennummernplatzhalter 2">
             <a:extLst>
               <a:ext uri="{FF2B5EF4-FFF2-40B4-BE49-F238E27FC236}">
-                <a16:creationId xmlns:a16="http://schemas.microsoft.com/office/drawing/2014/main" id="{BBDEB313-80BE-42A6-876F-E892E7589C83}"/>
-              </a:ext>
-            </a:extLst>
-          </p:cNvPr>
-          <p:cNvSpPr>
-            <a:spLocks noGrp="1"/>
-          </p:cNvSpPr>
-          <p:nvPr>
-            <p:ph idx="1"/>
-          </p:nvPr>
-        </p:nvSpPr>
-        <p:spPr/>
-        <p:txBody>
-          <a:bodyPr/>
-          <a:lstStyle/>
-          <a:p>
-            <a:r>
-              <a:rPr lang="en-GB" dirty="0"/>
-              <a:t>Use same blob detection</a:t>
-            </a:r>
-          </a:p>
-          <a:p>
-            <a:r>
-              <a:rPr lang="en-GB" dirty="0"/>
-              <a:t>Add up all blobs</a:t>
-            </a:r>
-          </a:p>
-          <a:p>
-            <a:r>
-              <a:rPr lang="en-GB" dirty="0"/>
-              <a:t>Then use CNN for classification</a:t>
-            </a:r>
-          </a:p>
-        </p:txBody>
-      </p:sp>
-      <p:sp>
-        <p:nvSpPr>
-          <p:cNvPr id="3" name="Foliennummernplatzhalter 2">
-            <a:extLst>
-              <a:ext uri="{FF2B5EF4-FFF2-40B4-BE49-F238E27FC236}">
-                <a16:creationId xmlns:a16="http://schemas.microsoft.com/office/drawing/2014/main" id="{45FDC699-C2A0-4921-BD9D-330BF42AFE41}"/>
+                <a16:creationId xmlns:a16="http://schemas.microsoft.com/office/drawing/2014/main" id="{A0AD3461-D246-4240-B04A-3B49916BE50E}"/>
               </a:ext>
             </a:extLst>
           </p:cNvPr>
@@ -5918,7 +5730,7 @@
           <p:cNvPr id="4" name="Titel 3">
             <a:extLst>
               <a:ext uri="{FF2B5EF4-FFF2-40B4-BE49-F238E27FC236}">
-                <a16:creationId xmlns:a16="http://schemas.microsoft.com/office/drawing/2014/main" id="{60B01397-2CC6-4F47-ABD1-3984BD598D97}"/>
+                <a16:creationId xmlns:a16="http://schemas.microsoft.com/office/drawing/2014/main" id="{9F31D83D-1764-4D98-8916-75B26B305D1C}"/>
               </a:ext>
             </a:extLst>
           </p:cNvPr>
@@ -5932,7 +5744,7 @@
         <p:spPr>
           <a:xfrm>
             <a:off x="251520" y="171451"/>
-            <a:ext cx="8928992" cy="820625"/>
+            <a:ext cx="9001000" cy="820625"/>
           </a:xfrm>
         </p:spPr>
         <p:txBody>
@@ -5941,16 +5753,159 @@
           <a:p>
             <a:r>
               <a:rPr lang="en-GB" dirty="0"/>
-              <a:t>Step 3 - Gesture recognition – First Approach</a:t>
-            </a:r>
-            <a:endParaRPr lang="en-DE" dirty="0"/>
-          </a:p>
-        </p:txBody>
-      </p:sp>
+              <a:t>Step 3- Gesture recognition – First Approach</a:t>
+            </a:r>
+          </a:p>
+        </p:txBody>
+      </p:sp>
+      <p:pic>
+        <p:nvPicPr>
+          <p:cNvPr id="6" name="Grafik 5">
+            <a:extLst>
+              <a:ext uri="{FF2B5EF4-FFF2-40B4-BE49-F238E27FC236}">
+                <a16:creationId xmlns:a16="http://schemas.microsoft.com/office/drawing/2014/main" id="{142D84E6-734B-427D-8E62-F9677FF9BE42}"/>
+              </a:ext>
+            </a:extLst>
+          </p:cNvPr>
+          <p:cNvPicPr>
+            <a:picLocks noChangeAspect="1"/>
+          </p:cNvPicPr>
+          <p:nvPr/>
+        </p:nvPicPr>
+        <p:blipFill>
+          <a:blip r:embed="rId2">
+            <a:extLst>
+              <a:ext uri="{28A0092B-C50C-407E-A947-70E740481C1C}">
+                <a14:useLocalDpi xmlns:a14="http://schemas.microsoft.com/office/drawing/2010/main" val="0"/>
+              </a:ext>
+            </a:extLst>
+          </a:blip>
+          <a:stretch>
+            <a:fillRect/>
+          </a:stretch>
+        </p:blipFill>
+        <p:spPr>
+          <a:xfrm>
+            <a:off x="6516218" y="1142818"/>
+            <a:ext cx="1900731" cy="3147541"/>
+          </a:xfrm>
+          <a:prstGeom prst="rect">
+            <a:avLst/>
+          </a:prstGeom>
+        </p:spPr>
+      </p:pic>
+      <p:pic>
+        <p:nvPicPr>
+          <p:cNvPr id="8" name="Grafik 7">
+            <a:extLst>
+              <a:ext uri="{FF2B5EF4-FFF2-40B4-BE49-F238E27FC236}">
+                <a16:creationId xmlns:a16="http://schemas.microsoft.com/office/drawing/2014/main" id="{72C5A5FA-97E5-46A2-896E-431BD1D571CB}"/>
+              </a:ext>
+            </a:extLst>
+          </p:cNvPr>
+          <p:cNvPicPr>
+            <a:picLocks noChangeAspect="1"/>
+          </p:cNvPicPr>
+          <p:nvPr/>
+        </p:nvPicPr>
+        <p:blipFill>
+          <a:blip r:embed="rId3">
+            <a:extLst>
+              <a:ext uri="{28A0092B-C50C-407E-A947-70E740481C1C}">
+                <a14:useLocalDpi xmlns:a14="http://schemas.microsoft.com/office/drawing/2010/main" val="0"/>
+              </a:ext>
+            </a:extLst>
+          </a:blip>
+          <a:stretch>
+            <a:fillRect/>
+          </a:stretch>
+        </p:blipFill>
+        <p:spPr>
+          <a:xfrm>
+            <a:off x="287524" y="1142818"/>
+            <a:ext cx="1900731" cy="3147542"/>
+          </a:xfrm>
+          <a:prstGeom prst="rect">
+            <a:avLst/>
+          </a:prstGeom>
+        </p:spPr>
+      </p:pic>
+      <p:pic>
+        <p:nvPicPr>
+          <p:cNvPr id="10" name="Grafik 9">
+            <a:extLst>
+              <a:ext uri="{FF2B5EF4-FFF2-40B4-BE49-F238E27FC236}">
+                <a16:creationId xmlns:a16="http://schemas.microsoft.com/office/drawing/2014/main" id="{754CD845-6716-4671-9749-E22708B0270E}"/>
+              </a:ext>
+            </a:extLst>
+          </p:cNvPr>
+          <p:cNvPicPr>
+            <a:picLocks noChangeAspect="1"/>
+          </p:cNvPicPr>
+          <p:nvPr/>
+        </p:nvPicPr>
+        <p:blipFill>
+          <a:blip r:embed="rId4">
+            <a:extLst>
+              <a:ext uri="{28A0092B-C50C-407E-A947-70E740481C1C}">
+                <a14:useLocalDpi xmlns:a14="http://schemas.microsoft.com/office/drawing/2010/main" val="0"/>
+              </a:ext>
+            </a:extLst>
+          </a:blip>
+          <a:stretch>
+            <a:fillRect/>
+          </a:stretch>
+        </p:blipFill>
+        <p:spPr>
+          <a:xfrm>
+            <a:off x="2339752" y="1142818"/>
+            <a:ext cx="1900731" cy="3147542"/>
+          </a:xfrm>
+          <a:prstGeom prst="rect">
+            <a:avLst/>
+          </a:prstGeom>
+        </p:spPr>
+      </p:pic>
+      <p:pic>
+        <p:nvPicPr>
+          <p:cNvPr id="12" name="Grafik 11">
+            <a:extLst>
+              <a:ext uri="{FF2B5EF4-FFF2-40B4-BE49-F238E27FC236}">
+                <a16:creationId xmlns:a16="http://schemas.microsoft.com/office/drawing/2014/main" id="{CB38C1D1-4CDC-44D1-9D2C-0EF15591C217}"/>
+              </a:ext>
+            </a:extLst>
+          </p:cNvPr>
+          <p:cNvPicPr>
+            <a:picLocks noChangeAspect="1"/>
+          </p:cNvPicPr>
+          <p:nvPr/>
+        </p:nvPicPr>
+        <p:blipFill>
+          <a:blip r:embed="rId5">
+            <a:extLst>
+              <a:ext uri="{28A0092B-C50C-407E-A947-70E740481C1C}">
+                <a14:useLocalDpi xmlns:a14="http://schemas.microsoft.com/office/drawing/2010/main" val="0"/>
+              </a:ext>
+            </a:extLst>
+          </a:blip>
+          <a:stretch>
+            <a:fillRect/>
+          </a:stretch>
+        </p:blipFill>
+        <p:spPr>
+          <a:xfrm>
+            <a:off x="4427985" y="1142819"/>
+            <a:ext cx="1900731" cy="3147541"/>
+          </a:xfrm>
+          <a:prstGeom prst="rect">
+            <a:avLst/>
+          </a:prstGeom>
+        </p:spPr>
+      </p:pic>
     </p:spTree>
     <p:extLst>
       <p:ext uri="{BB962C8B-B14F-4D97-AF65-F5344CB8AC3E}">
-        <p14:creationId xmlns:p14="http://schemas.microsoft.com/office/powerpoint/2010/main" val="2616312968"/>
+        <p14:creationId xmlns:p14="http://schemas.microsoft.com/office/powerpoint/2010/main" val="3016737685"/>
       </p:ext>
     </p:extLst>
   </p:cSld>
@@ -6025,7 +5980,7 @@
         <p:spPr>
           <a:xfrm>
             <a:off x="251520" y="171451"/>
-            <a:ext cx="9001000" cy="820625"/>
+            <a:ext cx="9145016" cy="820625"/>
           </a:xfrm>
         </p:spPr>
         <p:txBody>
@@ -6034,7 +5989,7 @@
           <a:p>
             <a:r>
               <a:rPr lang="en-GB" dirty="0"/>
-              <a:t>Step 3- Gesture recognition – First Approach</a:t>
+              <a:t>Step 3 - Gesture recognition – First Approach</a:t>
             </a:r>
           </a:p>
         </p:txBody>
@@ -6068,7 +6023,7 @@
         <p:spPr>
           <a:xfrm>
             <a:off x="6516218" y="1142818"/>
-            <a:ext cx="1900731" cy="3147541"/>
+            <a:ext cx="1900731" cy="3147540"/>
           </a:xfrm>
           <a:prstGeom prst="rect">
             <a:avLst/>
@@ -6103,8 +6058,8 @@
         </p:blipFill>
         <p:spPr>
           <a:xfrm>
-            <a:off x="287524" y="1142818"/>
-            <a:ext cx="1900731" cy="3147542"/>
+            <a:off x="287524" y="1142819"/>
+            <a:ext cx="1900731" cy="3147540"/>
           </a:xfrm>
           <a:prstGeom prst="rect">
             <a:avLst/>
@@ -6139,8 +6094,8 @@
         </p:blipFill>
         <p:spPr>
           <a:xfrm>
-            <a:off x="2339752" y="1142818"/>
-            <a:ext cx="1900731" cy="3147542"/>
+            <a:off x="2339752" y="1142819"/>
+            <a:ext cx="1900731" cy="3147540"/>
           </a:xfrm>
           <a:prstGeom prst="rect">
             <a:avLst/>
@@ -6176,7 +6131,7 @@
         <p:spPr>
           <a:xfrm>
             <a:off x="4427985" y="1142819"/>
-            <a:ext cx="1900731" cy="3147541"/>
+            <a:ext cx="1900731" cy="3147540"/>
           </a:xfrm>
           <a:prstGeom prst="rect">
             <a:avLst/>
@@ -6186,7 +6141,7 @@
     </p:spTree>
     <p:extLst>
       <p:ext uri="{BB962C8B-B14F-4D97-AF65-F5344CB8AC3E}">
-        <p14:creationId xmlns:p14="http://schemas.microsoft.com/office/powerpoint/2010/main" val="3016737685"/>
+        <p14:creationId xmlns:p14="http://schemas.microsoft.com/office/powerpoint/2010/main" val="3284188939"/>
       </p:ext>
     </p:extLst>
   </p:cSld>
@@ -6213,81 +6168,21 @@
           <a:chExt cx="0" cy="0"/>
         </a:xfrm>
       </p:grpSpPr>
-      <p:sp>
-        <p:nvSpPr>
-          <p:cNvPr id="3" name="Foliennummernplatzhalter 2">
-            <a:extLst>
-              <a:ext uri="{FF2B5EF4-FFF2-40B4-BE49-F238E27FC236}">
-                <a16:creationId xmlns:a16="http://schemas.microsoft.com/office/drawing/2014/main" id="{A0AD3461-D246-4240-B04A-3B49916BE50E}"/>
-              </a:ext>
-            </a:extLst>
-          </p:cNvPr>
-          <p:cNvSpPr>
-            <a:spLocks noGrp="1"/>
-          </p:cNvSpPr>
-          <p:nvPr>
-            <p:ph type="sldNum" sz="quarter" idx="12"/>
-          </p:nvPr>
-        </p:nvSpPr>
-        <p:spPr/>
-        <p:txBody>
-          <a:bodyPr/>
-          <a:lstStyle/>
-          <a:p>
-            <a:fld id="{29AD3987-26BA-49DC-BA24-72731371DC9F}" type="slidenum">
-              <a:rPr lang="de-DE" smtClean="0"/>
-              <a:t>9</a:t>
-            </a:fld>
-            <a:endParaRPr lang="de-DE" dirty="0"/>
-          </a:p>
-        </p:txBody>
-      </p:sp>
-      <p:sp>
-        <p:nvSpPr>
-          <p:cNvPr id="4" name="Titel 3">
-            <a:extLst>
-              <a:ext uri="{FF2B5EF4-FFF2-40B4-BE49-F238E27FC236}">
-                <a16:creationId xmlns:a16="http://schemas.microsoft.com/office/drawing/2014/main" id="{9F31D83D-1764-4D98-8916-75B26B305D1C}"/>
-              </a:ext>
-            </a:extLst>
-          </p:cNvPr>
-          <p:cNvSpPr>
-            <a:spLocks noGrp="1"/>
-          </p:cNvSpPr>
-          <p:nvPr>
-            <p:ph type="title"/>
-          </p:nvPr>
-        </p:nvSpPr>
-        <p:spPr>
-          <a:xfrm>
-            <a:off x="251520" y="171451"/>
-            <a:ext cx="9145016" cy="820625"/>
-          </a:xfrm>
-        </p:spPr>
-        <p:txBody>
-          <a:bodyPr/>
-          <a:lstStyle/>
-          <a:p>
-            <a:r>
-              <a:rPr lang="en-GB" dirty="0"/>
-              <a:t>Step 3 - Gesture recognition – First Approach</a:t>
-            </a:r>
-          </a:p>
-        </p:txBody>
-      </p:sp>
       <p:pic>
         <p:nvPicPr>
-          <p:cNvPr id="6" name="Grafik 5">
+          <p:cNvPr id="6" name="Inhaltsplatzhalter 5">
             <a:extLst>
               <a:ext uri="{FF2B5EF4-FFF2-40B4-BE49-F238E27FC236}">
-                <a16:creationId xmlns:a16="http://schemas.microsoft.com/office/drawing/2014/main" id="{142D84E6-734B-427D-8E62-F9677FF9BE42}"/>
+                <a16:creationId xmlns:a16="http://schemas.microsoft.com/office/drawing/2014/main" id="{201A2C48-CE71-45D1-B651-097D8A492D9D}"/>
               </a:ext>
             </a:extLst>
           </p:cNvPr>
           <p:cNvPicPr>
-            <a:picLocks noChangeAspect="1"/>
+            <a:picLocks noGrp="1" noChangeAspect="1"/>
           </p:cNvPicPr>
-          <p:nvPr/>
+          <p:nvPr>
+            <p:ph idx="1"/>
+          </p:nvPr>
         </p:nvPicPr>
         <p:blipFill>
           <a:blip r:embed="rId2">
@@ -6303,126 +6198,73 @@
         </p:blipFill>
         <p:spPr>
           <a:xfrm>
-            <a:off x="6516218" y="1142818"/>
-            <a:ext cx="1900731" cy="3147540"/>
-          </a:xfrm>
-          <a:prstGeom prst="rect">
-            <a:avLst/>
-          </a:prstGeom>
+            <a:off x="1503697" y="1203325"/>
+            <a:ext cx="6136605" cy="3398838"/>
+          </a:xfrm>
         </p:spPr>
       </p:pic>
-      <p:pic>
-        <p:nvPicPr>
-          <p:cNvPr id="8" name="Grafik 7">
+      <p:sp>
+        <p:nvSpPr>
+          <p:cNvPr id="3" name="Foliennummernplatzhalter 2">
             <a:extLst>
               <a:ext uri="{FF2B5EF4-FFF2-40B4-BE49-F238E27FC236}">
-                <a16:creationId xmlns:a16="http://schemas.microsoft.com/office/drawing/2014/main" id="{72C5A5FA-97E5-46A2-896E-431BD1D571CB}"/>
+                <a16:creationId xmlns:a16="http://schemas.microsoft.com/office/drawing/2014/main" id="{C9816B91-26FF-408A-B023-1C677B5F3B9B}"/>
               </a:ext>
             </a:extLst>
           </p:cNvPr>
-          <p:cNvPicPr>
-            <a:picLocks noChangeAspect="1"/>
-          </p:cNvPicPr>
-          <p:nvPr/>
-        </p:nvPicPr>
-        <p:blipFill>
-          <a:blip r:embed="rId3">
-            <a:extLst>
-              <a:ext uri="{28A0092B-C50C-407E-A947-70E740481C1C}">
-                <a14:useLocalDpi xmlns:a14="http://schemas.microsoft.com/office/drawing/2010/main" val="0"/>
-              </a:ext>
-            </a:extLst>
-          </a:blip>
-          <a:stretch>
-            <a:fillRect/>
-          </a:stretch>
-        </p:blipFill>
-        <p:spPr>
-          <a:xfrm>
-            <a:off x="287524" y="1142819"/>
-            <a:ext cx="1900731" cy="3147540"/>
-          </a:xfrm>
-          <a:prstGeom prst="rect">
-            <a:avLst/>
-          </a:prstGeom>
-        </p:spPr>
-      </p:pic>
-      <p:pic>
-        <p:nvPicPr>
-          <p:cNvPr id="10" name="Grafik 9">
+          <p:cNvSpPr>
+            <a:spLocks noGrp="1"/>
+          </p:cNvSpPr>
+          <p:nvPr>
+            <p:ph type="sldNum" sz="quarter" idx="12"/>
+          </p:nvPr>
+        </p:nvSpPr>
+        <p:spPr/>
+        <p:txBody>
+          <a:bodyPr/>
+          <a:lstStyle/>
+          <a:p>
+            <a:fld id="{29AD3987-26BA-49DC-BA24-72731371DC9F}" type="slidenum">
+              <a:rPr lang="de-DE" smtClean="0"/>
+              <a:t>9</a:t>
+            </a:fld>
+            <a:endParaRPr lang="de-DE" dirty="0"/>
+          </a:p>
+        </p:txBody>
+      </p:sp>
+      <p:sp>
+        <p:nvSpPr>
+          <p:cNvPr id="4" name="Titel 3">
             <a:extLst>
               <a:ext uri="{FF2B5EF4-FFF2-40B4-BE49-F238E27FC236}">
-                <a16:creationId xmlns:a16="http://schemas.microsoft.com/office/drawing/2014/main" id="{754CD845-6716-4671-9749-E22708B0270E}"/>
+                <a16:creationId xmlns:a16="http://schemas.microsoft.com/office/drawing/2014/main" id="{5F546285-1A94-4CC7-A95D-E284F5184377}"/>
               </a:ext>
             </a:extLst>
           </p:cNvPr>
-          <p:cNvPicPr>
-            <a:picLocks noChangeAspect="1"/>
-          </p:cNvPicPr>
-          <p:nvPr/>
-        </p:nvPicPr>
-        <p:blipFill>
-          <a:blip r:embed="rId4">
-            <a:extLst>
-              <a:ext uri="{28A0092B-C50C-407E-A947-70E740481C1C}">
-                <a14:useLocalDpi xmlns:a14="http://schemas.microsoft.com/office/drawing/2010/main" val="0"/>
-              </a:ext>
-            </a:extLst>
-          </a:blip>
-          <a:stretch>
-            <a:fillRect/>
-          </a:stretch>
-        </p:blipFill>
-        <p:spPr>
-          <a:xfrm>
-            <a:off x="2339752" y="1142819"/>
-            <a:ext cx="1900731" cy="3147540"/>
-          </a:xfrm>
-          <a:prstGeom prst="rect">
-            <a:avLst/>
-          </a:prstGeom>
-        </p:spPr>
-      </p:pic>
-      <p:pic>
-        <p:nvPicPr>
-          <p:cNvPr id="12" name="Grafik 11">
-            <a:extLst>
-              <a:ext uri="{FF2B5EF4-FFF2-40B4-BE49-F238E27FC236}">
-                <a16:creationId xmlns:a16="http://schemas.microsoft.com/office/drawing/2014/main" id="{CB38C1D1-4CDC-44D1-9D2C-0EF15591C217}"/>
-              </a:ext>
-            </a:extLst>
-          </p:cNvPr>
-          <p:cNvPicPr>
-            <a:picLocks noChangeAspect="1"/>
-          </p:cNvPicPr>
-          <p:nvPr/>
-        </p:nvPicPr>
-        <p:blipFill>
-          <a:blip r:embed="rId5">
-            <a:extLst>
-              <a:ext uri="{28A0092B-C50C-407E-A947-70E740481C1C}">
-                <a14:useLocalDpi xmlns:a14="http://schemas.microsoft.com/office/drawing/2010/main" val="0"/>
-              </a:ext>
-            </a:extLst>
-          </a:blip>
-          <a:stretch>
-            <a:fillRect/>
-          </a:stretch>
-        </p:blipFill>
-        <p:spPr>
-          <a:xfrm>
-            <a:off x="4427985" y="1142819"/>
-            <a:ext cx="1900731" cy="3147540"/>
-          </a:xfrm>
-          <a:prstGeom prst="rect">
-            <a:avLst/>
-          </a:prstGeom>
-        </p:spPr>
-      </p:pic>
+          <p:cNvSpPr>
+            <a:spLocks noGrp="1"/>
+          </p:cNvSpPr>
+          <p:nvPr>
+            <p:ph type="title"/>
+          </p:nvPr>
+        </p:nvSpPr>
+        <p:spPr/>
+        <p:txBody>
+          <a:bodyPr/>
+          <a:lstStyle/>
+          <a:p>
+            <a:r>
+              <a:rPr lang="en-GB" dirty="0"/>
+              <a:t>Step 3 - Gesture Recognition - CNN</a:t>
+            </a:r>
+            <a:endParaRPr lang="en-DE" dirty="0"/>
+          </a:p>
+        </p:txBody>
+      </p:sp>
     </p:spTree>
     <p:extLst>
       <p:ext uri="{BB962C8B-B14F-4D97-AF65-F5344CB8AC3E}">
-        <p14:creationId xmlns:p14="http://schemas.microsoft.com/office/powerpoint/2010/main" val="3284188939"/>
+        <p14:creationId xmlns:p14="http://schemas.microsoft.com/office/powerpoint/2010/main" val="162208365"/>
       </p:ext>
     </p:extLst>
   </p:cSld>

</xml_diff>

<commit_message>
Added user study 15
</commit_message>
<xml_diff>
--- a/Presentations/InterimPresentation.pptx
+++ b/Presentations/InterimPresentation.pptx
@@ -628,6 +628,28 @@
           <a:lstStyle/>
           <a:p>
             <a:r>
+              <a:rPr lang="de-DE" dirty="0"/>
+              <a:t>2 </a:t>
+            </a:r>
+            <a:r>
+              <a:rPr lang="de-DE" dirty="0" err="1"/>
+              <a:t>blocks</a:t>
+            </a:r>
+            <a:endParaRPr lang="de-DE" dirty="0"/>
+          </a:p>
+          <a:p>
+            <a:r>
+              <a:rPr lang="de-DE" dirty="0"/>
+              <a:t>Optimizer: </a:t>
+            </a:r>
+            <a:r>
+              <a:rPr lang="de-DE" dirty="0" err="1"/>
+              <a:t>AdamOptimizer</a:t>
+            </a:r>
+            <a:endParaRPr lang="de-DE" dirty="0"/>
+          </a:p>
+          <a:p>
+            <a:r>
               <a:rPr lang="de-DE" dirty="0" err="1"/>
               <a:t>Flatten</a:t>
             </a:r>
@@ -704,6 +726,90 @@
 </file>
 
 <file path=ppt/notesSlides/notesSlide3.xml><?xml version="1.0" encoding="utf-8"?>
+<p:notes xmlns:a="http://schemas.openxmlformats.org/drawingml/2006/main" xmlns:r="http://schemas.openxmlformats.org/officeDocument/2006/relationships" xmlns:p="http://schemas.openxmlformats.org/presentationml/2006/main">
+  <p:cSld>
+    <p:spTree>
+      <p:nvGrpSpPr>
+        <p:cNvPr id="1" name=""/>
+        <p:cNvGrpSpPr/>
+        <p:nvPr/>
+      </p:nvGrpSpPr>
+      <p:grpSpPr>
+        <a:xfrm>
+          <a:off x="0" y="0"/>
+          <a:ext cx="0" cy="0"/>
+          <a:chOff x="0" y="0"/>
+          <a:chExt cx="0" cy="0"/>
+        </a:xfrm>
+      </p:grpSpPr>
+      <p:sp>
+        <p:nvSpPr>
+          <p:cNvPr id="2" name="Folienbildplatzhalter 1"/>
+          <p:cNvSpPr>
+            <a:spLocks noGrp="1" noRot="1" noChangeAspect="1"/>
+          </p:cNvSpPr>
+          <p:nvPr>
+            <p:ph type="sldImg"/>
+          </p:nvPr>
+        </p:nvSpPr>
+        <p:spPr/>
+      </p:sp>
+      <p:sp>
+        <p:nvSpPr>
+          <p:cNvPr id="3" name="Notizenplatzhalter 2"/>
+          <p:cNvSpPr>
+            <a:spLocks noGrp="1"/>
+          </p:cNvSpPr>
+          <p:nvPr>
+            <p:ph type="body" idx="1"/>
+          </p:nvPr>
+        </p:nvSpPr>
+        <p:spPr/>
+        <p:txBody>
+          <a:bodyPr/>
+          <a:lstStyle/>
+          <a:p>
+            <a:endParaRPr lang="de-DE" dirty="0"/>
+          </a:p>
+        </p:txBody>
+      </p:sp>
+      <p:sp>
+        <p:nvSpPr>
+          <p:cNvPr id="4" name="Foliennummernplatzhalter 3"/>
+          <p:cNvSpPr>
+            <a:spLocks noGrp="1"/>
+          </p:cNvSpPr>
+          <p:nvPr>
+            <p:ph type="sldNum" sz="quarter" idx="5"/>
+          </p:nvPr>
+        </p:nvSpPr>
+        <p:spPr/>
+        <p:txBody>
+          <a:bodyPr/>
+          <a:lstStyle/>
+          <a:p>
+            <a:fld id="{6F4F2A7C-E896-4C15-99D8-2B5BC94A4F36}" type="slidenum">
+              <a:rPr lang="de-DE" smtClean="0"/>
+              <a:t>5</a:t>
+            </a:fld>
+            <a:endParaRPr lang="de-DE"/>
+          </a:p>
+        </p:txBody>
+      </p:sp>
+    </p:spTree>
+    <p:extLst>
+      <p:ext uri="{BB962C8B-B14F-4D97-AF65-F5344CB8AC3E}">
+        <p14:creationId xmlns:p14="http://schemas.microsoft.com/office/powerpoint/2010/main" val="886079412"/>
+      </p:ext>
+    </p:extLst>
+  </p:cSld>
+  <p:clrMapOvr>
+    <a:masterClrMapping/>
+  </p:clrMapOvr>
+</p:notes>
+</file>
+
+<file path=ppt/notesSlides/notesSlide4.xml><?xml version="1.0" encoding="utf-8"?>
 <p:notes xmlns:a="http://schemas.openxmlformats.org/drawingml/2006/main" xmlns:r="http://schemas.openxmlformats.org/officeDocument/2006/relationships" xmlns:p="http://schemas.openxmlformats.org/presentationml/2006/main">
   <p:cSld>
     <p:spTree>
@@ -5474,13 +5580,13 @@
           <p:nvPr/>
         </p:nvPicPr>
         <p:blipFill>
-          <a:blip r:embed="rId2">
+          <a:blip r:embed="rId3">
             <a:extLst>
               <a:ext uri="{28A0092B-C50C-407E-A947-70E740481C1C}">
                 <a14:useLocalDpi xmlns:a14="http://schemas.microsoft.com/office/drawing/2010/main" val="0"/>
               </a:ext>
               <a:ext uri="{96DAC541-7B7A-43D3-8B79-37D633B846F1}">
-                <asvg:svgBlip xmlns:asvg="http://schemas.microsoft.com/office/drawing/2016/SVG/main" r:embed="rId3"/>
+                <asvg:svgBlip xmlns:asvg="http://schemas.microsoft.com/office/drawing/2016/SVG/main" r:embed="rId4"/>
               </a:ext>
             </a:extLst>
           </a:blip>
@@ -5513,7 +5619,7 @@
           <p:nvPr/>
         </p:nvPicPr>
         <p:blipFill rotWithShape="1">
-          <a:blip r:embed="rId4">
+          <a:blip r:embed="rId5">
             <a:extLst>
               <a:ext uri="{28A0092B-C50C-407E-A947-70E740481C1C}">
                 <a14:useLocalDpi xmlns:a14="http://schemas.microsoft.com/office/drawing/2010/main" val="0"/>

</xml_diff>